<commit_message>
path projet -> projet.docx path pptx -> optimized.pptx modified
</commit_message>
<xml_diff>
--- a/pptx/optimized.pptx
+++ b/pptx/optimized.pptx
@@ -11,7 +11,7 @@
     <p:sldId id="266" r:id="rId5"/>
     <p:sldId id="263" r:id="rId6"/>
     <p:sldId id="267" r:id="rId7"/>
-    <p:sldId id="268" r:id="rId8"/>
+    <p:sldId id="271" r:id="rId8"/>
     <p:sldId id="269" r:id="rId9"/>
     <p:sldId id="270" r:id="rId10"/>
   </p:sldIdLst>
@@ -308,7 +308,7 @@
           <a:p>
             <a:fld id="{A122F4C3-B122-458C-AF99-BE53E3DBA8EF}" type="datetimeFigureOut">
               <a:rPr lang="fr-FR" smtClean="0"/>
-              <a:t>08/11/2022</a:t>
+              <a:t>17/11/2022</a:t>
             </a:fld>
             <a:endParaRPr lang="fr-FR"/>
           </a:p>
@@ -646,7 +646,7 @@
           <a:p>
             <a:fld id="{A122F4C3-B122-458C-AF99-BE53E3DBA8EF}" type="datetimeFigureOut">
               <a:rPr lang="fr-FR" smtClean="0"/>
-              <a:t>08/11/2022</a:t>
+              <a:t>17/11/2022</a:t>
             </a:fld>
             <a:endParaRPr lang="fr-FR"/>
           </a:p>
@@ -1047,7 +1047,7 @@
           <a:p>
             <a:fld id="{A122F4C3-B122-458C-AF99-BE53E3DBA8EF}" type="datetimeFigureOut">
               <a:rPr lang="fr-FR" smtClean="0"/>
-              <a:t>08/11/2022</a:t>
+              <a:t>17/11/2022</a:t>
             </a:fld>
             <a:endParaRPr lang="fr-FR"/>
           </a:p>
@@ -1383,7 +1383,7 @@
           <a:p>
             <a:fld id="{A122F4C3-B122-458C-AF99-BE53E3DBA8EF}" type="datetimeFigureOut">
               <a:rPr lang="fr-FR" smtClean="0"/>
-              <a:t>08/11/2022</a:t>
+              <a:t>17/11/2022</a:t>
             </a:fld>
             <a:endParaRPr lang="fr-FR"/>
           </a:p>
@@ -1703,7 +1703,7 @@
           <a:p>
             <a:fld id="{A122F4C3-B122-458C-AF99-BE53E3DBA8EF}" type="datetimeFigureOut">
               <a:rPr lang="fr-FR" smtClean="0"/>
-              <a:t>08/11/2022</a:t>
+              <a:t>17/11/2022</a:t>
             </a:fld>
             <a:endParaRPr lang="fr-FR"/>
           </a:p>
@@ -2099,7 +2099,7 @@
           <a:p>
             <a:fld id="{A122F4C3-B122-458C-AF99-BE53E3DBA8EF}" type="datetimeFigureOut">
               <a:rPr lang="fr-FR" smtClean="0"/>
-              <a:t>08/11/2022</a:t>
+              <a:t>17/11/2022</a:t>
             </a:fld>
             <a:endParaRPr lang="fr-FR"/>
           </a:p>
@@ -2356,7 +2356,7 @@
           <a:p>
             <a:fld id="{A122F4C3-B122-458C-AF99-BE53E3DBA8EF}" type="datetimeFigureOut">
               <a:rPr lang="fr-FR" smtClean="0"/>
-              <a:t>08/11/2022</a:t>
+              <a:t>17/11/2022</a:t>
             </a:fld>
             <a:endParaRPr lang="fr-FR"/>
           </a:p>
@@ -2618,7 +2618,7 @@
           <a:p>
             <a:fld id="{A122F4C3-B122-458C-AF99-BE53E3DBA8EF}" type="datetimeFigureOut">
               <a:rPr lang="fr-FR" smtClean="0"/>
-              <a:t>08/11/2022</a:t>
+              <a:t>17/11/2022</a:t>
             </a:fld>
             <a:endParaRPr lang="fr-FR"/>
           </a:p>
@@ -2880,7 +2880,7 @@
           <a:p>
             <a:fld id="{A122F4C3-B122-458C-AF99-BE53E3DBA8EF}" type="datetimeFigureOut">
               <a:rPr lang="fr-FR" smtClean="0"/>
-              <a:t>08/11/2022</a:t>
+              <a:t>17/11/2022</a:t>
             </a:fld>
             <a:endParaRPr lang="fr-FR"/>
           </a:p>
@@ -3209,7 +3209,7 @@
           <a:p>
             <a:fld id="{A122F4C3-B122-458C-AF99-BE53E3DBA8EF}" type="datetimeFigureOut">
               <a:rPr lang="fr-FR" smtClean="0"/>
-              <a:t>08/11/2022</a:t>
+              <a:t>17/11/2022</a:t>
             </a:fld>
             <a:endParaRPr lang="fr-FR"/>
           </a:p>
@@ -3532,7 +3532,7 @@
           <a:p>
             <a:fld id="{A122F4C3-B122-458C-AF99-BE53E3DBA8EF}" type="datetimeFigureOut">
               <a:rPr lang="fr-FR" smtClean="0"/>
-              <a:t>08/11/2022</a:t>
+              <a:t>17/11/2022</a:t>
             </a:fld>
             <a:endParaRPr lang="fr-FR"/>
           </a:p>
@@ -3989,7 +3989,7 @@
           <a:p>
             <a:fld id="{A122F4C3-B122-458C-AF99-BE53E3DBA8EF}" type="datetimeFigureOut">
               <a:rPr lang="fr-FR" smtClean="0"/>
-              <a:t>08/11/2022</a:t>
+              <a:t>17/11/2022</a:t>
             </a:fld>
             <a:endParaRPr lang="fr-FR"/>
           </a:p>
@@ -4194,7 +4194,7 @@
           <a:p>
             <a:fld id="{A122F4C3-B122-458C-AF99-BE53E3DBA8EF}" type="datetimeFigureOut">
               <a:rPr lang="fr-FR" smtClean="0"/>
-              <a:t>08/11/2022</a:t>
+              <a:t>17/11/2022</a:t>
             </a:fld>
             <a:endParaRPr lang="fr-FR"/>
           </a:p>
@@ -4371,7 +4371,7 @@
           <a:p>
             <a:fld id="{A122F4C3-B122-458C-AF99-BE53E3DBA8EF}" type="datetimeFigureOut">
               <a:rPr lang="fr-FR" smtClean="0"/>
-              <a:t>08/11/2022</a:t>
+              <a:t>17/11/2022</a:t>
             </a:fld>
             <a:endParaRPr lang="fr-FR"/>
           </a:p>
@@ -4704,7 +4704,7 @@
           <a:p>
             <a:fld id="{A122F4C3-B122-458C-AF99-BE53E3DBA8EF}" type="datetimeFigureOut">
               <a:rPr lang="fr-FR" smtClean="0"/>
-              <a:t>08/11/2022</a:t>
+              <a:t>17/11/2022</a:t>
             </a:fld>
             <a:endParaRPr lang="fr-FR"/>
           </a:p>
@@ -5049,7 +5049,7 @@
           <a:p>
             <a:fld id="{A122F4C3-B122-458C-AF99-BE53E3DBA8EF}" type="datetimeFigureOut">
               <a:rPr lang="fr-FR" smtClean="0"/>
-              <a:t>08/11/2022</a:t>
+              <a:t>17/11/2022</a:t>
             </a:fld>
             <a:endParaRPr lang="fr-FR"/>
           </a:p>
@@ -7166,7 +7166,7 @@
           <a:p>
             <a:fld id="{A122F4C3-B122-458C-AF99-BE53E3DBA8EF}" type="datetimeFigureOut">
               <a:rPr lang="fr-FR" smtClean="0"/>
-              <a:t>08/11/2022</a:t>
+              <a:t>17/11/2022</a:t>
             </a:fld>
             <a:endParaRPr lang="fr-FR"/>
           </a:p>
@@ -11460,10 +11460,2749 @@
           </a:p>
         </p:txBody>
       </p:sp>
+      <p:graphicFrame>
+        <p:nvGraphicFramePr>
+          <p:cNvPr id="6" name="Tableau 6">
+            <a:extLst>
+              <a:ext uri="{FF2B5EF4-FFF2-40B4-BE49-F238E27FC236}">
+                <a16:creationId xmlns:a16="http://schemas.microsoft.com/office/drawing/2014/main" id="{79DDA308-9EF3-ACF4-A51B-8209EC7B3EFB}"/>
+              </a:ext>
+            </a:extLst>
+          </p:cNvPr>
+          <p:cNvGraphicFramePr>
+            <a:graphicFrameLocks noGrp="1"/>
+          </p:cNvGraphicFramePr>
+          <p:nvPr>
+            <p:extLst>
+              <p:ext uri="{D42A27DB-BD31-4B8C-83A1-F6EECF244321}">
+                <p14:modId xmlns:p14="http://schemas.microsoft.com/office/powerpoint/2010/main" val="1157447363"/>
+              </p:ext>
+            </p:extLst>
+          </p:nvPr>
+        </p:nvGraphicFramePr>
+        <p:xfrm>
+          <a:off x="3070371" y="128999"/>
+          <a:ext cx="6585358" cy="6558594"/>
+        </p:xfrm>
+        <a:graphic>
+          <a:graphicData uri="http://schemas.openxmlformats.org/drawingml/2006/table">
+            <a:tbl>
+              <a:tblPr firstRow="1" bandRow="1">
+                <a:tableStyleId>{5C22544A-7EE6-4342-B048-85BDC9FD1C3A}</a:tableStyleId>
+              </a:tblPr>
+              <a:tblGrid>
+                <a:gridCol w="940766">
+                  <a:extLst>
+                    <a:ext uri="{9D8B030D-6E8A-4147-A177-3AD203B41FA5}">
+                      <a16:colId xmlns:a16="http://schemas.microsoft.com/office/drawing/2014/main" val="2429013739"/>
+                    </a:ext>
+                  </a:extLst>
+                </a:gridCol>
+                <a:gridCol w="693898">
+                  <a:extLst>
+                    <a:ext uri="{9D8B030D-6E8A-4147-A177-3AD203B41FA5}">
+                      <a16:colId xmlns:a16="http://schemas.microsoft.com/office/drawing/2014/main" val="142876222"/>
+                    </a:ext>
+                  </a:extLst>
+                </a:gridCol>
+                <a:gridCol w="869077">
+                  <a:extLst>
+                    <a:ext uri="{9D8B030D-6E8A-4147-A177-3AD203B41FA5}">
+                      <a16:colId xmlns:a16="http://schemas.microsoft.com/office/drawing/2014/main" val="3263084874"/>
+                    </a:ext>
+                  </a:extLst>
+                </a:gridCol>
+                <a:gridCol w="1137081">
+                  <a:extLst>
+                    <a:ext uri="{9D8B030D-6E8A-4147-A177-3AD203B41FA5}">
+                      <a16:colId xmlns:a16="http://schemas.microsoft.com/office/drawing/2014/main" val="3870928557"/>
+                    </a:ext>
+                  </a:extLst>
+                </a:gridCol>
+                <a:gridCol w="729842">
+                  <a:extLst>
+                    <a:ext uri="{9D8B030D-6E8A-4147-A177-3AD203B41FA5}">
+                      <a16:colId xmlns:a16="http://schemas.microsoft.com/office/drawing/2014/main" val="3908793082"/>
+                    </a:ext>
+                  </a:extLst>
+                </a:gridCol>
+                <a:gridCol w="1057013">
+                  <a:extLst>
+                    <a:ext uri="{9D8B030D-6E8A-4147-A177-3AD203B41FA5}">
+                      <a16:colId xmlns:a16="http://schemas.microsoft.com/office/drawing/2014/main" val="2164881713"/>
+                    </a:ext>
+                  </a:extLst>
+                </a:gridCol>
+                <a:gridCol w="1157681">
+                  <a:extLst>
+                    <a:ext uri="{9D8B030D-6E8A-4147-A177-3AD203B41FA5}">
+                      <a16:colId xmlns:a16="http://schemas.microsoft.com/office/drawing/2014/main" val="1452232839"/>
+                    </a:ext>
+                  </a:extLst>
+                </a:gridCol>
+              </a:tblGrid>
+              <a:tr h="290451">
+                <a:tc>
+                  <a:txBody>
+                    <a:bodyPr/>
+                    <a:lstStyle/>
+                    <a:p>
+                      <a:pPr algn="ctr"/>
+                      <a:r>
+                        <a:rPr lang="fr-FR" sz="1000" dirty="0">
+                          <a:latin typeface="Verdana" panose="020B0604030504040204" pitchFamily="34" charset="0"/>
+                          <a:ea typeface="Verdana" panose="020B0604030504040204" pitchFamily="34" charset="0"/>
+                        </a:rPr>
+                        <a:t>Action</a:t>
+                      </a:r>
+                    </a:p>
+                  </a:txBody>
+                  <a:tcPr/>
+                </a:tc>
+                <a:tc>
+                  <a:txBody>
+                    <a:bodyPr/>
+                    <a:lstStyle/>
+                    <a:p>
+                      <a:pPr algn="ctr"/>
+                      <a:r>
+                        <a:rPr lang="fr-FR" sz="1000" dirty="0">
+                          <a:latin typeface="Verdana" panose="020B0604030504040204" pitchFamily="34" charset="0"/>
+                          <a:ea typeface="Verdana" panose="020B0604030504040204" pitchFamily="34" charset="0"/>
+                        </a:rPr>
+                        <a:t>Binaire</a:t>
+                      </a:r>
+                    </a:p>
+                  </a:txBody>
+                  <a:tcPr/>
+                </a:tc>
+                <a:tc>
+                  <a:txBody>
+                    <a:bodyPr/>
+                    <a:lstStyle/>
+                    <a:p>
+                      <a:pPr marL="0" marR="0" lvl="0" indent="0" algn="ctr" defTabSz="457200" rtl="0" eaLnBrk="1" fontAlgn="auto" latinLnBrk="0" hangingPunct="1">
+                        <a:lnSpc>
+                          <a:spcPct val="100000"/>
+                        </a:lnSpc>
+                        <a:spcBef>
+                          <a:spcPts val="0"/>
+                        </a:spcBef>
+                        <a:spcAft>
+                          <a:spcPts val="0"/>
+                        </a:spcAft>
+                        <a:buClrTx/>
+                        <a:buSzTx/>
+                        <a:buFontTx/>
+                        <a:buNone/>
+                        <a:tabLst/>
+                        <a:defRPr/>
+                      </a:pPr>
+                      <a:r>
+                        <a:rPr lang="fr-FR" sz="1000" dirty="0">
+                          <a:latin typeface="Verdana" panose="020B0604030504040204" pitchFamily="34" charset="0"/>
+                          <a:ea typeface="Verdana" panose="020B0604030504040204" pitchFamily="34" charset="0"/>
+                        </a:rPr>
+                        <a:t>Coût</a:t>
+                      </a:r>
+                    </a:p>
+                  </a:txBody>
+                  <a:tcPr/>
+                </a:tc>
+                <a:tc>
+                  <a:txBody>
+                    <a:bodyPr/>
+                    <a:lstStyle/>
+                    <a:p>
+                      <a:pPr marL="0" marR="0" lvl="0" indent="0" algn="ctr" defTabSz="457200" rtl="0" eaLnBrk="1" fontAlgn="auto" latinLnBrk="0" hangingPunct="1">
+                        <a:lnSpc>
+                          <a:spcPct val="100000"/>
+                        </a:lnSpc>
+                        <a:spcBef>
+                          <a:spcPts val="0"/>
+                        </a:spcBef>
+                        <a:spcAft>
+                          <a:spcPts val="0"/>
+                        </a:spcAft>
+                        <a:buClrTx/>
+                        <a:buSzTx/>
+                        <a:buFontTx/>
+                        <a:buNone/>
+                        <a:tabLst/>
+                        <a:defRPr/>
+                      </a:pPr>
+                      <a:r>
+                        <a:rPr lang="fr-FR" sz="1000" dirty="0">
+                          <a:latin typeface="Verdana" panose="020B0604030504040204" pitchFamily="34" charset="0"/>
+                          <a:ea typeface="Verdana" panose="020B0604030504040204" pitchFamily="34" charset="0"/>
+                        </a:rPr>
+                        <a:t>Pourcentage</a:t>
+                      </a:r>
+                    </a:p>
+                  </a:txBody>
+                  <a:tcPr/>
+                </a:tc>
+                <a:tc>
+                  <a:txBody>
+                    <a:bodyPr/>
+                    <a:lstStyle/>
+                    <a:p>
+                      <a:pPr algn="ctr"/>
+                      <a:r>
+                        <a:rPr lang="fr-FR" sz="1000" dirty="0">
+                          <a:latin typeface="Verdana" panose="020B0604030504040204" pitchFamily="34" charset="0"/>
+                          <a:ea typeface="Verdana" panose="020B0604030504040204" pitchFamily="34" charset="0"/>
+                        </a:rPr>
+                        <a:t>Profit</a:t>
+                      </a:r>
+                    </a:p>
+                  </a:txBody>
+                  <a:tcPr/>
+                </a:tc>
+                <a:tc>
+                  <a:txBody>
+                    <a:bodyPr/>
+                    <a:lstStyle/>
+                    <a:p>
+                      <a:pPr algn="ctr"/>
+                      <a:endParaRPr lang="fr-FR" sz="1000" dirty="0">
+                        <a:latin typeface="Verdana" panose="020B0604030504040204" pitchFamily="34" charset="0"/>
+                        <a:ea typeface="Verdana" panose="020B0604030504040204" pitchFamily="34" charset="0"/>
+                      </a:endParaRPr>
+                    </a:p>
+                  </a:txBody>
+                  <a:tcPr/>
+                </a:tc>
+                <a:tc>
+                  <a:txBody>
+                    <a:bodyPr/>
+                    <a:lstStyle/>
+                    <a:p>
+                      <a:pPr algn="ctr"/>
+                      <a:endParaRPr lang="fr-FR" sz="1000" dirty="0">
+                        <a:latin typeface="Verdana" panose="020B0604030504040204" pitchFamily="34" charset="0"/>
+                        <a:ea typeface="Verdana" panose="020B0604030504040204" pitchFamily="34" charset="0"/>
+                      </a:endParaRPr>
+                    </a:p>
+                  </a:txBody>
+                  <a:tcPr/>
+                </a:tc>
+                <a:extLst>
+                  <a:ext uri="{0D108BD9-81ED-4DB2-BD59-A6C34878D82A}">
+                    <a16:rowId xmlns:a16="http://schemas.microsoft.com/office/drawing/2014/main" val="2538325701"/>
+                  </a:ext>
+                </a:extLst>
+              </a:tr>
+              <a:tr h="298483">
+                <a:tc>
+                  <a:txBody>
+                    <a:bodyPr/>
+                    <a:lstStyle/>
+                    <a:p>
+                      <a:pPr marL="0" marR="0" lvl="0" indent="0" algn="l" defTabSz="457200" rtl="0" eaLnBrk="1" fontAlgn="auto" latinLnBrk="0" hangingPunct="1">
+                        <a:lnSpc>
+                          <a:spcPct val="100000"/>
+                        </a:lnSpc>
+                        <a:spcBef>
+                          <a:spcPts val="0"/>
+                        </a:spcBef>
+                        <a:spcAft>
+                          <a:spcPts val="0"/>
+                        </a:spcAft>
+                        <a:buClrTx/>
+                        <a:buSzTx/>
+                        <a:buFontTx/>
+                        <a:buNone/>
+                        <a:tabLst/>
+                        <a:defRPr/>
+                      </a:pPr>
+                      <a:r>
+                        <a:rPr lang="fr-FR" sz="1000" dirty="0">
+                          <a:latin typeface="Verdana" panose="020B0604030504040204" pitchFamily="34" charset="0"/>
+                          <a:ea typeface="Verdana" panose="020B0604030504040204" pitchFamily="34" charset="0"/>
+                        </a:rPr>
+                        <a:t>Action-20</a:t>
+                      </a:r>
+                    </a:p>
+                  </a:txBody>
+                  <a:tcPr/>
+                </a:tc>
+                <a:tc>
+                  <a:txBody>
+                    <a:bodyPr/>
+                    <a:lstStyle/>
+                    <a:p>
+                      <a:pPr algn="ctr"/>
+                      <a:endParaRPr lang="fr-FR" sz="1000" dirty="0">
+                        <a:latin typeface="Verdana" panose="020B0604030504040204" pitchFamily="34" charset="0"/>
+                        <a:ea typeface="Verdana" panose="020B0604030504040204" pitchFamily="34" charset="0"/>
+                      </a:endParaRPr>
+                    </a:p>
+                  </a:txBody>
+                  <a:tcPr/>
+                </a:tc>
+                <a:tc>
+                  <a:txBody>
+                    <a:bodyPr/>
+                    <a:lstStyle/>
+                    <a:p>
+                      <a:pPr algn="ctr"/>
+                      <a:r>
+                        <a:rPr lang="fr-FR" sz="1000" dirty="0">
+                          <a:latin typeface="Verdana" panose="020B0604030504040204" pitchFamily="34" charset="0"/>
+                          <a:ea typeface="Verdana" panose="020B0604030504040204" pitchFamily="34" charset="0"/>
+                        </a:rPr>
+                        <a:t>114</a:t>
+                      </a:r>
+                    </a:p>
+                  </a:txBody>
+                  <a:tcPr/>
+                </a:tc>
+                <a:tc>
+                  <a:txBody>
+                    <a:bodyPr/>
+                    <a:lstStyle/>
+                    <a:p>
+                      <a:pPr algn="ctr"/>
+                      <a:r>
+                        <a:rPr lang="fr-FR" sz="1000" dirty="0">
+                          <a:latin typeface="Verdana" panose="020B0604030504040204" pitchFamily="34" charset="0"/>
+                          <a:ea typeface="Verdana" panose="020B0604030504040204" pitchFamily="34" charset="0"/>
+                        </a:rPr>
+                        <a:t>18</a:t>
+                      </a:r>
+                    </a:p>
+                  </a:txBody>
+                  <a:tcPr/>
+                </a:tc>
+                <a:tc>
+                  <a:txBody>
+                    <a:bodyPr/>
+                    <a:lstStyle/>
+                    <a:p>
+                      <a:pPr algn="ctr"/>
+                      <a:r>
+                        <a:rPr lang="fr-FR" sz="1000" dirty="0">
+                          <a:latin typeface="Verdana" panose="020B0604030504040204" pitchFamily="34" charset="0"/>
+                          <a:ea typeface="Verdana" panose="020B0604030504040204" pitchFamily="34" charset="0"/>
+                        </a:rPr>
+                        <a:t>20,52</a:t>
+                      </a:r>
+                    </a:p>
+                  </a:txBody>
+                  <a:tcPr/>
+                </a:tc>
+                <a:tc>
+                  <a:txBody>
+                    <a:bodyPr/>
+                    <a:lstStyle/>
+                    <a:p>
+                      <a:endParaRPr lang="fr-FR" sz="1000" dirty="0">
+                        <a:latin typeface="Verdana" panose="020B0604030504040204" pitchFamily="34" charset="0"/>
+                        <a:ea typeface="Verdana" panose="020B0604030504040204" pitchFamily="34" charset="0"/>
+                      </a:endParaRPr>
+                    </a:p>
+                  </a:txBody>
+                  <a:tcPr/>
+                </a:tc>
+                <a:tc>
+                  <a:txBody>
+                    <a:bodyPr/>
+                    <a:lstStyle/>
+                    <a:p>
+                      <a:endParaRPr lang="fr-FR" sz="1000" dirty="0">
+                        <a:latin typeface="Verdana" panose="020B0604030504040204" pitchFamily="34" charset="0"/>
+                        <a:ea typeface="Verdana" panose="020B0604030504040204" pitchFamily="34" charset="0"/>
+                      </a:endParaRPr>
+                    </a:p>
+                  </a:txBody>
+                  <a:tcPr/>
+                </a:tc>
+                <a:extLst>
+                  <a:ext uri="{0D108BD9-81ED-4DB2-BD59-A6C34878D82A}">
+                    <a16:rowId xmlns:a16="http://schemas.microsoft.com/office/drawing/2014/main" val="82971673"/>
+                  </a:ext>
+                </a:extLst>
+              </a:tr>
+              <a:tr h="298483">
+                <a:tc>
+                  <a:txBody>
+                    <a:bodyPr/>
+                    <a:lstStyle/>
+                    <a:p>
+                      <a:r>
+                        <a:rPr lang="fr-FR" sz="1000" dirty="0">
+                          <a:latin typeface="Verdana" panose="020B0604030504040204" pitchFamily="34" charset="0"/>
+                          <a:ea typeface="Verdana" panose="020B0604030504040204" pitchFamily="34" charset="0"/>
+                        </a:rPr>
+                        <a:t>Action-6</a:t>
+                      </a:r>
+                    </a:p>
+                  </a:txBody>
+                  <a:tcPr/>
+                </a:tc>
+                <a:tc>
+                  <a:txBody>
+                    <a:bodyPr/>
+                    <a:lstStyle/>
+                    <a:p>
+                      <a:pPr algn="ctr"/>
+                      <a:endParaRPr lang="fr-FR" sz="1000" dirty="0">
+                        <a:latin typeface="Verdana" panose="020B0604030504040204" pitchFamily="34" charset="0"/>
+                        <a:ea typeface="Verdana" panose="020B0604030504040204" pitchFamily="34" charset="0"/>
+                      </a:endParaRPr>
+                    </a:p>
+                  </a:txBody>
+                  <a:tcPr/>
+                </a:tc>
+                <a:tc>
+                  <a:txBody>
+                    <a:bodyPr/>
+                    <a:lstStyle/>
+                    <a:p>
+                      <a:pPr algn="ctr"/>
+                      <a:r>
+                        <a:rPr lang="fr-FR" sz="1000" dirty="0">
+                          <a:latin typeface="Verdana" panose="020B0604030504040204" pitchFamily="34" charset="0"/>
+                          <a:ea typeface="Verdana" panose="020B0604030504040204" pitchFamily="34" charset="0"/>
+                        </a:rPr>
+                        <a:t>80</a:t>
+                      </a:r>
+                    </a:p>
+                  </a:txBody>
+                  <a:tcPr/>
+                </a:tc>
+                <a:tc>
+                  <a:txBody>
+                    <a:bodyPr/>
+                    <a:lstStyle/>
+                    <a:p>
+                      <a:pPr algn="ctr"/>
+                      <a:r>
+                        <a:rPr lang="fr-FR" sz="1000" dirty="0">
+                          <a:latin typeface="Verdana" panose="020B0604030504040204" pitchFamily="34" charset="0"/>
+                          <a:ea typeface="Verdana" panose="020B0604030504040204" pitchFamily="34" charset="0"/>
+                        </a:rPr>
+                        <a:t>25</a:t>
+                      </a:r>
+                    </a:p>
+                  </a:txBody>
+                  <a:tcPr/>
+                </a:tc>
+                <a:tc>
+                  <a:txBody>
+                    <a:bodyPr/>
+                    <a:lstStyle/>
+                    <a:p>
+                      <a:pPr algn="ctr"/>
+                      <a:r>
+                        <a:rPr lang="fr-FR" sz="1000" dirty="0">
+                          <a:latin typeface="Verdana" panose="020B0604030504040204" pitchFamily="34" charset="0"/>
+                          <a:ea typeface="Verdana" panose="020B0604030504040204" pitchFamily="34" charset="0"/>
+                        </a:rPr>
+                        <a:t>20</a:t>
+                      </a:r>
+                    </a:p>
+                  </a:txBody>
+                  <a:tcPr/>
+                </a:tc>
+                <a:tc>
+                  <a:txBody>
+                    <a:bodyPr/>
+                    <a:lstStyle/>
+                    <a:p>
+                      <a:endParaRPr lang="fr-FR" sz="1000">
+                        <a:latin typeface="Verdana" panose="020B0604030504040204" pitchFamily="34" charset="0"/>
+                        <a:ea typeface="Verdana" panose="020B0604030504040204" pitchFamily="34" charset="0"/>
+                      </a:endParaRPr>
+                    </a:p>
+                  </a:txBody>
+                  <a:tcPr/>
+                </a:tc>
+                <a:tc>
+                  <a:txBody>
+                    <a:bodyPr/>
+                    <a:lstStyle/>
+                    <a:p>
+                      <a:endParaRPr lang="fr-FR" sz="1000" dirty="0">
+                        <a:latin typeface="Verdana" panose="020B0604030504040204" pitchFamily="34" charset="0"/>
+                        <a:ea typeface="Verdana" panose="020B0604030504040204" pitchFamily="34" charset="0"/>
+                      </a:endParaRPr>
+                    </a:p>
+                  </a:txBody>
+                  <a:tcPr/>
+                </a:tc>
+                <a:extLst>
+                  <a:ext uri="{0D108BD9-81ED-4DB2-BD59-A6C34878D82A}">
+                    <a16:rowId xmlns:a16="http://schemas.microsoft.com/office/drawing/2014/main" val="4103083701"/>
+                  </a:ext>
+                </a:extLst>
+              </a:tr>
+              <a:tr h="298483">
+                <a:tc>
+                  <a:txBody>
+                    <a:bodyPr/>
+                    <a:lstStyle/>
+                    <a:p>
+                      <a:r>
+                        <a:rPr lang="fr-FR" sz="1000" dirty="0">
+                          <a:latin typeface="Verdana" panose="020B0604030504040204" pitchFamily="34" charset="0"/>
+                          <a:ea typeface="Verdana" panose="020B0604030504040204" pitchFamily="34" charset="0"/>
+                        </a:rPr>
+                        <a:t>Action-4</a:t>
+                      </a:r>
+                    </a:p>
+                  </a:txBody>
+                  <a:tcPr/>
+                </a:tc>
+                <a:tc>
+                  <a:txBody>
+                    <a:bodyPr/>
+                    <a:lstStyle/>
+                    <a:p>
+                      <a:pPr algn="ctr"/>
+                      <a:endParaRPr lang="fr-FR" sz="1000" dirty="0">
+                        <a:latin typeface="Verdana" panose="020B0604030504040204" pitchFamily="34" charset="0"/>
+                        <a:ea typeface="Verdana" panose="020B0604030504040204" pitchFamily="34" charset="0"/>
+                      </a:endParaRPr>
+                    </a:p>
+                  </a:txBody>
+                  <a:tcPr/>
+                </a:tc>
+                <a:tc>
+                  <a:txBody>
+                    <a:bodyPr/>
+                    <a:lstStyle/>
+                    <a:p>
+                      <a:pPr algn="ctr"/>
+                      <a:r>
+                        <a:rPr lang="fr-FR" sz="1000" dirty="0">
+                          <a:latin typeface="Verdana" panose="020B0604030504040204" pitchFamily="34" charset="0"/>
+                          <a:ea typeface="Verdana" panose="020B0604030504040204" pitchFamily="34" charset="0"/>
+                        </a:rPr>
+                        <a:t>70</a:t>
+                      </a:r>
+                    </a:p>
+                  </a:txBody>
+                  <a:tcPr/>
+                </a:tc>
+                <a:tc>
+                  <a:txBody>
+                    <a:bodyPr/>
+                    <a:lstStyle/>
+                    <a:p>
+                      <a:pPr algn="ctr"/>
+                      <a:r>
+                        <a:rPr lang="fr-FR" sz="1000" dirty="0">
+                          <a:latin typeface="Verdana" panose="020B0604030504040204" pitchFamily="34" charset="0"/>
+                          <a:ea typeface="Verdana" panose="020B0604030504040204" pitchFamily="34" charset="0"/>
+                        </a:rPr>
+                        <a:t>20</a:t>
+                      </a:r>
+                    </a:p>
+                  </a:txBody>
+                  <a:tcPr/>
+                </a:tc>
+                <a:tc>
+                  <a:txBody>
+                    <a:bodyPr/>
+                    <a:lstStyle/>
+                    <a:p>
+                      <a:pPr algn="ctr"/>
+                      <a:r>
+                        <a:rPr lang="fr-FR" sz="1000" dirty="0">
+                          <a:latin typeface="Verdana" panose="020B0604030504040204" pitchFamily="34" charset="0"/>
+                          <a:ea typeface="Verdana" panose="020B0604030504040204" pitchFamily="34" charset="0"/>
+                        </a:rPr>
+                        <a:t>14</a:t>
+                      </a:r>
+                    </a:p>
+                  </a:txBody>
+                  <a:tcPr/>
+                </a:tc>
+                <a:tc>
+                  <a:txBody>
+                    <a:bodyPr/>
+                    <a:lstStyle/>
+                    <a:p>
+                      <a:endParaRPr lang="fr-FR" sz="1000">
+                        <a:latin typeface="Verdana" panose="020B0604030504040204" pitchFamily="34" charset="0"/>
+                        <a:ea typeface="Verdana" panose="020B0604030504040204" pitchFamily="34" charset="0"/>
+                      </a:endParaRPr>
+                    </a:p>
+                  </a:txBody>
+                  <a:tcPr/>
+                </a:tc>
+                <a:tc>
+                  <a:txBody>
+                    <a:bodyPr/>
+                    <a:lstStyle/>
+                    <a:p>
+                      <a:endParaRPr lang="fr-FR" sz="1000" dirty="0">
+                        <a:latin typeface="Verdana" panose="020B0604030504040204" pitchFamily="34" charset="0"/>
+                        <a:ea typeface="Verdana" panose="020B0604030504040204" pitchFamily="34" charset="0"/>
+                      </a:endParaRPr>
+                    </a:p>
+                  </a:txBody>
+                  <a:tcPr/>
+                </a:tc>
+                <a:extLst>
+                  <a:ext uri="{0D108BD9-81ED-4DB2-BD59-A6C34878D82A}">
+                    <a16:rowId xmlns:a16="http://schemas.microsoft.com/office/drawing/2014/main" val="2929579842"/>
+                  </a:ext>
+                </a:extLst>
+              </a:tr>
+              <a:tr h="298483">
+                <a:tc>
+                  <a:txBody>
+                    <a:bodyPr/>
+                    <a:lstStyle/>
+                    <a:p>
+                      <a:r>
+                        <a:rPr lang="fr-FR" sz="1000" dirty="0">
+                          <a:latin typeface="Verdana" panose="020B0604030504040204" pitchFamily="34" charset="0"/>
+                          <a:ea typeface="Verdana" panose="020B0604030504040204" pitchFamily="34" charset="0"/>
+                        </a:rPr>
+                        <a:t>Action-5</a:t>
+                      </a:r>
+                    </a:p>
+                  </a:txBody>
+                  <a:tcPr/>
+                </a:tc>
+                <a:tc>
+                  <a:txBody>
+                    <a:bodyPr/>
+                    <a:lstStyle/>
+                    <a:p>
+                      <a:pPr algn="ctr"/>
+                      <a:endParaRPr lang="fr-FR" sz="1000" dirty="0">
+                        <a:latin typeface="Verdana" panose="020B0604030504040204" pitchFamily="34" charset="0"/>
+                        <a:ea typeface="Verdana" panose="020B0604030504040204" pitchFamily="34" charset="0"/>
+                      </a:endParaRPr>
+                    </a:p>
+                  </a:txBody>
+                  <a:tcPr/>
+                </a:tc>
+                <a:tc>
+                  <a:txBody>
+                    <a:bodyPr/>
+                    <a:lstStyle/>
+                    <a:p>
+                      <a:pPr algn="ctr"/>
+                      <a:r>
+                        <a:rPr lang="fr-FR" sz="1000" dirty="0">
+                          <a:latin typeface="Verdana" panose="020B0604030504040204" pitchFamily="34" charset="0"/>
+                          <a:ea typeface="Verdana" panose="020B0604030504040204" pitchFamily="34" charset="0"/>
+                        </a:rPr>
+                        <a:t>60</a:t>
+                      </a:r>
+                    </a:p>
+                  </a:txBody>
+                  <a:tcPr/>
+                </a:tc>
+                <a:tc>
+                  <a:txBody>
+                    <a:bodyPr/>
+                    <a:lstStyle/>
+                    <a:p>
+                      <a:pPr algn="ctr"/>
+                      <a:r>
+                        <a:rPr lang="fr-FR" sz="1000" dirty="0">
+                          <a:latin typeface="Verdana" panose="020B0604030504040204" pitchFamily="34" charset="0"/>
+                          <a:ea typeface="Verdana" panose="020B0604030504040204" pitchFamily="34" charset="0"/>
+                        </a:rPr>
+                        <a:t>17</a:t>
+                      </a:r>
+                    </a:p>
+                  </a:txBody>
+                  <a:tcPr/>
+                </a:tc>
+                <a:tc>
+                  <a:txBody>
+                    <a:bodyPr/>
+                    <a:lstStyle/>
+                    <a:p>
+                      <a:pPr algn="ctr"/>
+                      <a:r>
+                        <a:rPr lang="fr-FR" sz="1000" dirty="0">
+                          <a:latin typeface="Verdana" panose="020B0604030504040204" pitchFamily="34" charset="0"/>
+                          <a:ea typeface="Verdana" panose="020B0604030504040204" pitchFamily="34" charset="0"/>
+                        </a:rPr>
+                        <a:t>10,2</a:t>
+                      </a:r>
+                    </a:p>
+                  </a:txBody>
+                  <a:tcPr/>
+                </a:tc>
+                <a:tc>
+                  <a:txBody>
+                    <a:bodyPr/>
+                    <a:lstStyle/>
+                    <a:p>
+                      <a:endParaRPr lang="fr-FR" sz="1000" dirty="0">
+                        <a:latin typeface="Verdana" panose="020B0604030504040204" pitchFamily="34" charset="0"/>
+                        <a:ea typeface="Verdana" panose="020B0604030504040204" pitchFamily="34" charset="0"/>
+                      </a:endParaRPr>
+                    </a:p>
+                  </a:txBody>
+                  <a:tcPr/>
+                </a:tc>
+                <a:tc>
+                  <a:txBody>
+                    <a:bodyPr/>
+                    <a:lstStyle/>
+                    <a:p>
+                      <a:endParaRPr lang="fr-FR" sz="1000" dirty="0">
+                        <a:latin typeface="Verdana" panose="020B0604030504040204" pitchFamily="34" charset="0"/>
+                        <a:ea typeface="Verdana" panose="020B0604030504040204" pitchFamily="34" charset="0"/>
+                      </a:endParaRPr>
+                    </a:p>
+                  </a:txBody>
+                  <a:tcPr/>
+                </a:tc>
+                <a:extLst>
+                  <a:ext uri="{0D108BD9-81ED-4DB2-BD59-A6C34878D82A}">
+                    <a16:rowId xmlns:a16="http://schemas.microsoft.com/office/drawing/2014/main" val="3395794850"/>
+                  </a:ext>
+                </a:extLst>
+              </a:tr>
+              <a:tr h="298483">
+                <a:tc>
+                  <a:txBody>
+                    <a:bodyPr/>
+                    <a:lstStyle/>
+                    <a:p>
+                      <a:r>
+                        <a:rPr lang="fr-FR" sz="1000" dirty="0">
+                          <a:latin typeface="Verdana" panose="020B0604030504040204" pitchFamily="34" charset="0"/>
+                          <a:ea typeface="Verdana" panose="020B0604030504040204" pitchFamily="34" charset="0"/>
+                        </a:rPr>
+                        <a:t>Action-12</a:t>
+                      </a:r>
+                    </a:p>
+                  </a:txBody>
+                  <a:tcPr/>
+                </a:tc>
+                <a:tc>
+                  <a:txBody>
+                    <a:bodyPr/>
+                    <a:lstStyle/>
+                    <a:p>
+                      <a:pPr algn="ctr"/>
+                      <a:endParaRPr lang="fr-FR" sz="1000" dirty="0">
+                        <a:latin typeface="Verdana" panose="020B0604030504040204" pitchFamily="34" charset="0"/>
+                        <a:ea typeface="Verdana" panose="020B0604030504040204" pitchFamily="34" charset="0"/>
+                      </a:endParaRPr>
+                    </a:p>
+                  </a:txBody>
+                  <a:tcPr/>
+                </a:tc>
+                <a:tc>
+                  <a:txBody>
+                    <a:bodyPr/>
+                    <a:lstStyle/>
+                    <a:p>
+                      <a:pPr algn="ctr"/>
+                      <a:r>
+                        <a:rPr lang="fr-FR" sz="1000" dirty="0">
+                          <a:latin typeface="Verdana" panose="020B0604030504040204" pitchFamily="34" charset="0"/>
+                          <a:ea typeface="Verdana" panose="020B0604030504040204" pitchFamily="34" charset="0"/>
+                        </a:rPr>
+                        <a:t>110</a:t>
+                      </a:r>
+                    </a:p>
+                  </a:txBody>
+                  <a:tcPr/>
+                </a:tc>
+                <a:tc>
+                  <a:txBody>
+                    <a:bodyPr/>
+                    <a:lstStyle/>
+                    <a:p>
+                      <a:pPr algn="ctr"/>
+                      <a:r>
+                        <a:rPr lang="fr-FR" sz="1000" dirty="0">
+                          <a:latin typeface="Verdana" panose="020B0604030504040204" pitchFamily="34" charset="0"/>
+                          <a:ea typeface="Verdana" panose="020B0604030504040204" pitchFamily="34" charset="0"/>
+                        </a:rPr>
+                        <a:t>9</a:t>
+                      </a:r>
+                    </a:p>
+                  </a:txBody>
+                  <a:tcPr/>
+                </a:tc>
+                <a:tc>
+                  <a:txBody>
+                    <a:bodyPr/>
+                    <a:lstStyle/>
+                    <a:p>
+                      <a:pPr algn="ctr"/>
+                      <a:r>
+                        <a:rPr lang="fr-FR" sz="1000" dirty="0">
+                          <a:latin typeface="Verdana" panose="020B0604030504040204" pitchFamily="34" charset="0"/>
+                          <a:ea typeface="Verdana" panose="020B0604030504040204" pitchFamily="34" charset="0"/>
+                        </a:rPr>
+                        <a:t>9,9</a:t>
+                      </a:r>
+                    </a:p>
+                  </a:txBody>
+                  <a:tcPr/>
+                </a:tc>
+                <a:tc>
+                  <a:txBody>
+                    <a:bodyPr/>
+                    <a:lstStyle/>
+                    <a:p>
+                      <a:endParaRPr lang="fr-FR" sz="1000">
+                        <a:latin typeface="Verdana" panose="020B0604030504040204" pitchFamily="34" charset="0"/>
+                        <a:ea typeface="Verdana" panose="020B0604030504040204" pitchFamily="34" charset="0"/>
+                      </a:endParaRPr>
+                    </a:p>
+                  </a:txBody>
+                  <a:tcPr/>
+                </a:tc>
+                <a:tc>
+                  <a:txBody>
+                    <a:bodyPr/>
+                    <a:lstStyle/>
+                    <a:p>
+                      <a:endParaRPr lang="fr-FR" sz="1000" dirty="0">
+                        <a:latin typeface="Verdana" panose="020B0604030504040204" pitchFamily="34" charset="0"/>
+                        <a:ea typeface="Verdana" panose="020B0604030504040204" pitchFamily="34" charset="0"/>
+                      </a:endParaRPr>
+                    </a:p>
+                  </a:txBody>
+                  <a:tcPr/>
+                </a:tc>
+                <a:extLst>
+                  <a:ext uri="{0D108BD9-81ED-4DB2-BD59-A6C34878D82A}">
+                    <a16:rowId xmlns:a16="http://schemas.microsoft.com/office/drawing/2014/main" val="51218223"/>
+                  </a:ext>
+                </a:extLst>
+              </a:tr>
+              <a:tr h="298483">
+                <a:tc>
+                  <a:txBody>
+                    <a:bodyPr/>
+                    <a:lstStyle/>
+                    <a:p>
+                      <a:r>
+                        <a:rPr lang="fr-FR" sz="1000" dirty="0">
+                          <a:latin typeface="Verdana" panose="020B0604030504040204" pitchFamily="34" charset="0"/>
+                          <a:ea typeface="Verdana" panose="020B0604030504040204" pitchFamily="34" charset="0"/>
+                        </a:rPr>
+                        <a:t>Action-10</a:t>
+                      </a:r>
+                    </a:p>
+                  </a:txBody>
+                  <a:tcPr/>
+                </a:tc>
+                <a:tc>
+                  <a:txBody>
+                    <a:bodyPr/>
+                    <a:lstStyle/>
+                    <a:p>
+                      <a:pPr algn="ctr"/>
+                      <a:endParaRPr lang="fr-FR" sz="1000" dirty="0">
+                        <a:latin typeface="Verdana" panose="020B0604030504040204" pitchFamily="34" charset="0"/>
+                        <a:ea typeface="Verdana" panose="020B0604030504040204" pitchFamily="34" charset="0"/>
+                      </a:endParaRPr>
+                    </a:p>
+                  </a:txBody>
+                  <a:tcPr/>
+                </a:tc>
+                <a:tc>
+                  <a:txBody>
+                    <a:bodyPr/>
+                    <a:lstStyle/>
+                    <a:p>
+                      <a:pPr algn="ctr"/>
+                      <a:r>
+                        <a:rPr lang="fr-FR" sz="1000" dirty="0">
+                          <a:latin typeface="Verdana" panose="020B0604030504040204" pitchFamily="34" charset="0"/>
+                          <a:ea typeface="Verdana" panose="020B0604030504040204" pitchFamily="34" charset="0"/>
+                        </a:rPr>
+                        <a:t>34</a:t>
+                      </a:r>
+                    </a:p>
+                  </a:txBody>
+                  <a:tcPr/>
+                </a:tc>
+                <a:tc>
+                  <a:txBody>
+                    <a:bodyPr/>
+                    <a:lstStyle/>
+                    <a:p>
+                      <a:pPr algn="ctr"/>
+                      <a:r>
+                        <a:rPr lang="fr-FR" sz="1000" dirty="0">
+                          <a:latin typeface="Verdana" panose="020B0604030504040204" pitchFamily="34" charset="0"/>
+                          <a:ea typeface="Verdana" panose="020B0604030504040204" pitchFamily="34" charset="0"/>
+                        </a:rPr>
+                        <a:t>27</a:t>
+                      </a:r>
+                    </a:p>
+                  </a:txBody>
+                  <a:tcPr/>
+                </a:tc>
+                <a:tc>
+                  <a:txBody>
+                    <a:bodyPr/>
+                    <a:lstStyle/>
+                    <a:p>
+                      <a:pPr algn="ctr"/>
+                      <a:r>
+                        <a:rPr lang="fr-FR" sz="1000" dirty="0">
+                          <a:latin typeface="Verdana" panose="020B0604030504040204" pitchFamily="34" charset="0"/>
+                          <a:ea typeface="Verdana" panose="020B0604030504040204" pitchFamily="34" charset="0"/>
+                        </a:rPr>
+                        <a:t>9,18</a:t>
+                      </a:r>
+                    </a:p>
+                  </a:txBody>
+                  <a:tcPr/>
+                </a:tc>
+                <a:tc>
+                  <a:txBody>
+                    <a:bodyPr/>
+                    <a:lstStyle/>
+                    <a:p>
+                      <a:endParaRPr lang="fr-FR" sz="1000">
+                        <a:latin typeface="Verdana" panose="020B0604030504040204" pitchFamily="34" charset="0"/>
+                        <a:ea typeface="Verdana" panose="020B0604030504040204" pitchFamily="34" charset="0"/>
+                      </a:endParaRPr>
+                    </a:p>
+                  </a:txBody>
+                  <a:tcPr/>
+                </a:tc>
+                <a:tc>
+                  <a:txBody>
+                    <a:bodyPr/>
+                    <a:lstStyle/>
+                    <a:p>
+                      <a:endParaRPr lang="fr-FR" sz="1000" dirty="0">
+                        <a:latin typeface="Verdana" panose="020B0604030504040204" pitchFamily="34" charset="0"/>
+                        <a:ea typeface="Verdana" panose="020B0604030504040204" pitchFamily="34" charset="0"/>
+                      </a:endParaRPr>
+                    </a:p>
+                  </a:txBody>
+                  <a:tcPr/>
+                </a:tc>
+                <a:extLst>
+                  <a:ext uri="{0D108BD9-81ED-4DB2-BD59-A6C34878D82A}">
+                    <a16:rowId xmlns:a16="http://schemas.microsoft.com/office/drawing/2014/main" val="1446063226"/>
+                  </a:ext>
+                </a:extLst>
+              </a:tr>
+              <a:tr h="298483">
+                <a:tc>
+                  <a:txBody>
+                    <a:bodyPr/>
+                    <a:lstStyle/>
+                    <a:p>
+                      <a:r>
+                        <a:rPr lang="fr-FR" sz="1000" dirty="0">
+                          <a:latin typeface="Verdana" panose="020B0604030504040204" pitchFamily="34" charset="0"/>
+                          <a:ea typeface="Verdana" panose="020B0604030504040204" pitchFamily="34" charset="0"/>
+                        </a:rPr>
+                        <a:t>Action-13</a:t>
+                      </a:r>
+                    </a:p>
+                  </a:txBody>
+                  <a:tcPr/>
+                </a:tc>
+                <a:tc>
+                  <a:txBody>
+                    <a:bodyPr/>
+                    <a:lstStyle/>
+                    <a:p>
+                      <a:pPr algn="ctr"/>
+                      <a:endParaRPr lang="fr-FR" sz="1000" dirty="0">
+                        <a:latin typeface="Verdana" panose="020B0604030504040204" pitchFamily="34" charset="0"/>
+                        <a:ea typeface="Verdana" panose="020B0604030504040204" pitchFamily="34" charset="0"/>
+                      </a:endParaRPr>
+                    </a:p>
+                  </a:txBody>
+                  <a:tcPr/>
+                </a:tc>
+                <a:tc>
+                  <a:txBody>
+                    <a:bodyPr/>
+                    <a:lstStyle/>
+                    <a:p>
+                      <a:pPr algn="ctr"/>
+                      <a:r>
+                        <a:rPr lang="fr-FR" sz="1000" dirty="0">
+                          <a:latin typeface="Verdana" panose="020B0604030504040204" pitchFamily="34" charset="0"/>
+                          <a:ea typeface="Verdana" panose="020B0604030504040204" pitchFamily="34" charset="0"/>
+                        </a:rPr>
+                        <a:t>38</a:t>
+                      </a:r>
+                    </a:p>
+                  </a:txBody>
+                  <a:tcPr/>
+                </a:tc>
+                <a:tc>
+                  <a:txBody>
+                    <a:bodyPr/>
+                    <a:lstStyle/>
+                    <a:p>
+                      <a:pPr algn="ctr"/>
+                      <a:r>
+                        <a:rPr lang="fr-FR" sz="1000" dirty="0">
+                          <a:latin typeface="Verdana" panose="020B0604030504040204" pitchFamily="34" charset="0"/>
+                          <a:ea typeface="Verdana" panose="020B0604030504040204" pitchFamily="34" charset="0"/>
+                        </a:rPr>
+                        <a:t>23</a:t>
+                      </a:r>
+                    </a:p>
+                  </a:txBody>
+                  <a:tcPr/>
+                </a:tc>
+                <a:tc>
+                  <a:txBody>
+                    <a:bodyPr/>
+                    <a:lstStyle/>
+                    <a:p>
+                      <a:pPr algn="ctr"/>
+                      <a:r>
+                        <a:rPr lang="fr-FR" sz="1000" dirty="0">
+                          <a:latin typeface="Verdana" panose="020B0604030504040204" pitchFamily="34" charset="0"/>
+                          <a:ea typeface="Verdana" panose="020B0604030504040204" pitchFamily="34" charset="0"/>
+                        </a:rPr>
+                        <a:t>8,74</a:t>
+                      </a:r>
+                    </a:p>
+                  </a:txBody>
+                  <a:tcPr/>
+                </a:tc>
+                <a:tc>
+                  <a:txBody>
+                    <a:bodyPr/>
+                    <a:lstStyle/>
+                    <a:p>
+                      <a:endParaRPr lang="fr-FR" sz="1000">
+                        <a:latin typeface="Verdana" panose="020B0604030504040204" pitchFamily="34" charset="0"/>
+                        <a:ea typeface="Verdana" panose="020B0604030504040204" pitchFamily="34" charset="0"/>
+                      </a:endParaRPr>
+                    </a:p>
+                  </a:txBody>
+                  <a:tcPr/>
+                </a:tc>
+                <a:tc>
+                  <a:txBody>
+                    <a:bodyPr/>
+                    <a:lstStyle/>
+                    <a:p>
+                      <a:endParaRPr lang="fr-FR" sz="1000" dirty="0">
+                        <a:latin typeface="Verdana" panose="020B0604030504040204" pitchFamily="34" charset="0"/>
+                        <a:ea typeface="Verdana" panose="020B0604030504040204" pitchFamily="34" charset="0"/>
+                      </a:endParaRPr>
+                    </a:p>
+                  </a:txBody>
+                  <a:tcPr/>
+                </a:tc>
+                <a:extLst>
+                  <a:ext uri="{0D108BD9-81ED-4DB2-BD59-A6C34878D82A}">
+                    <a16:rowId xmlns:a16="http://schemas.microsoft.com/office/drawing/2014/main" val="1432200308"/>
+                  </a:ext>
+                </a:extLst>
+              </a:tr>
+              <a:tr h="298483">
+                <a:tc>
+                  <a:txBody>
+                    <a:bodyPr/>
+                    <a:lstStyle/>
+                    <a:p>
+                      <a:r>
+                        <a:rPr lang="fr-FR" sz="1000" dirty="0">
+                          <a:latin typeface="Verdana" panose="020B0604030504040204" pitchFamily="34" charset="0"/>
+                          <a:ea typeface="Verdana" panose="020B0604030504040204" pitchFamily="34" charset="0"/>
+                        </a:rPr>
+                        <a:t>Action-3</a:t>
+                      </a:r>
+                    </a:p>
+                  </a:txBody>
+                  <a:tcPr/>
+                </a:tc>
+                <a:tc>
+                  <a:txBody>
+                    <a:bodyPr/>
+                    <a:lstStyle/>
+                    <a:p>
+                      <a:pPr algn="ctr"/>
+                      <a:endParaRPr lang="fr-FR" sz="1000" dirty="0">
+                        <a:latin typeface="Verdana" panose="020B0604030504040204" pitchFamily="34" charset="0"/>
+                        <a:ea typeface="Verdana" panose="020B0604030504040204" pitchFamily="34" charset="0"/>
+                      </a:endParaRPr>
+                    </a:p>
+                  </a:txBody>
+                  <a:tcPr/>
+                </a:tc>
+                <a:tc>
+                  <a:txBody>
+                    <a:bodyPr/>
+                    <a:lstStyle/>
+                    <a:p>
+                      <a:pPr algn="ctr"/>
+                      <a:r>
+                        <a:rPr lang="fr-FR" sz="1000" dirty="0">
+                          <a:latin typeface="Verdana" panose="020B0604030504040204" pitchFamily="34" charset="0"/>
+                          <a:ea typeface="Verdana" panose="020B0604030504040204" pitchFamily="34" charset="0"/>
+                        </a:rPr>
+                        <a:t>50</a:t>
+                      </a:r>
+                    </a:p>
+                  </a:txBody>
+                  <a:tcPr/>
+                </a:tc>
+                <a:tc>
+                  <a:txBody>
+                    <a:bodyPr/>
+                    <a:lstStyle/>
+                    <a:p>
+                      <a:pPr algn="ctr"/>
+                      <a:r>
+                        <a:rPr lang="fr-FR" sz="1000" dirty="0">
+                          <a:latin typeface="Verdana" panose="020B0604030504040204" pitchFamily="34" charset="0"/>
+                          <a:ea typeface="Verdana" panose="020B0604030504040204" pitchFamily="34" charset="0"/>
+                        </a:rPr>
+                        <a:t>15</a:t>
+                      </a:r>
+                    </a:p>
+                  </a:txBody>
+                  <a:tcPr/>
+                </a:tc>
+                <a:tc>
+                  <a:txBody>
+                    <a:bodyPr/>
+                    <a:lstStyle/>
+                    <a:p>
+                      <a:pPr algn="ctr"/>
+                      <a:r>
+                        <a:rPr lang="fr-FR" sz="1000" dirty="0">
+                          <a:latin typeface="Verdana" panose="020B0604030504040204" pitchFamily="34" charset="0"/>
+                          <a:ea typeface="Verdana" panose="020B0604030504040204" pitchFamily="34" charset="0"/>
+                        </a:rPr>
+                        <a:t>7,5</a:t>
+                      </a:r>
+                    </a:p>
+                  </a:txBody>
+                  <a:tcPr/>
+                </a:tc>
+                <a:tc>
+                  <a:txBody>
+                    <a:bodyPr/>
+                    <a:lstStyle/>
+                    <a:p>
+                      <a:endParaRPr lang="fr-FR" sz="1000">
+                        <a:latin typeface="Verdana" panose="020B0604030504040204" pitchFamily="34" charset="0"/>
+                        <a:ea typeface="Verdana" panose="020B0604030504040204" pitchFamily="34" charset="0"/>
+                      </a:endParaRPr>
+                    </a:p>
+                  </a:txBody>
+                  <a:tcPr/>
+                </a:tc>
+                <a:tc>
+                  <a:txBody>
+                    <a:bodyPr/>
+                    <a:lstStyle/>
+                    <a:p>
+                      <a:endParaRPr lang="fr-FR" sz="1000" dirty="0">
+                        <a:latin typeface="Verdana" panose="020B0604030504040204" pitchFamily="34" charset="0"/>
+                        <a:ea typeface="Verdana" panose="020B0604030504040204" pitchFamily="34" charset="0"/>
+                      </a:endParaRPr>
+                    </a:p>
+                  </a:txBody>
+                  <a:tcPr/>
+                </a:tc>
+                <a:extLst>
+                  <a:ext uri="{0D108BD9-81ED-4DB2-BD59-A6C34878D82A}">
+                    <a16:rowId xmlns:a16="http://schemas.microsoft.com/office/drawing/2014/main" val="488484700"/>
+                  </a:ext>
+                </a:extLst>
+              </a:tr>
+              <a:tr h="298483">
+                <a:tc>
+                  <a:txBody>
+                    <a:bodyPr/>
+                    <a:lstStyle/>
+                    <a:p>
+                      <a:r>
+                        <a:rPr lang="fr-FR" sz="1000" dirty="0">
+                          <a:latin typeface="Verdana" panose="020B0604030504040204" pitchFamily="34" charset="0"/>
+                          <a:ea typeface="Verdana" panose="020B0604030504040204" pitchFamily="34" charset="0"/>
+                        </a:rPr>
+                        <a:t>Action-11</a:t>
+                      </a:r>
+                    </a:p>
+                  </a:txBody>
+                  <a:tcPr/>
+                </a:tc>
+                <a:tc>
+                  <a:txBody>
+                    <a:bodyPr/>
+                    <a:lstStyle/>
+                    <a:p>
+                      <a:pPr algn="ctr"/>
+                      <a:endParaRPr lang="fr-FR" sz="1000" dirty="0">
+                        <a:latin typeface="Verdana" panose="020B0604030504040204" pitchFamily="34" charset="0"/>
+                        <a:ea typeface="Verdana" panose="020B0604030504040204" pitchFamily="34" charset="0"/>
+                      </a:endParaRPr>
+                    </a:p>
+                  </a:txBody>
+                  <a:tcPr/>
+                </a:tc>
+                <a:tc>
+                  <a:txBody>
+                    <a:bodyPr/>
+                    <a:lstStyle/>
+                    <a:p>
+                      <a:pPr algn="ctr"/>
+                      <a:r>
+                        <a:rPr lang="fr-FR" sz="1000" dirty="0">
+                          <a:latin typeface="Verdana" panose="020B0604030504040204" pitchFamily="34" charset="0"/>
+                          <a:ea typeface="Verdana" panose="020B0604030504040204" pitchFamily="34" charset="0"/>
+                        </a:rPr>
+                        <a:t>42</a:t>
+                      </a:r>
+                    </a:p>
+                  </a:txBody>
+                  <a:tcPr/>
+                </a:tc>
+                <a:tc>
+                  <a:txBody>
+                    <a:bodyPr/>
+                    <a:lstStyle/>
+                    <a:p>
+                      <a:pPr algn="ctr"/>
+                      <a:r>
+                        <a:rPr lang="fr-FR" sz="1000" dirty="0">
+                          <a:latin typeface="Verdana" panose="020B0604030504040204" pitchFamily="34" charset="0"/>
+                          <a:ea typeface="Verdana" panose="020B0604030504040204" pitchFamily="34" charset="0"/>
+                        </a:rPr>
+                        <a:t>17</a:t>
+                      </a:r>
+                    </a:p>
+                  </a:txBody>
+                  <a:tcPr/>
+                </a:tc>
+                <a:tc>
+                  <a:txBody>
+                    <a:bodyPr/>
+                    <a:lstStyle/>
+                    <a:p>
+                      <a:pPr algn="ctr"/>
+                      <a:r>
+                        <a:rPr lang="fr-FR" sz="1000" dirty="0">
+                          <a:latin typeface="Verdana" panose="020B0604030504040204" pitchFamily="34" charset="0"/>
+                          <a:ea typeface="Verdana" panose="020B0604030504040204" pitchFamily="34" charset="0"/>
+                        </a:rPr>
+                        <a:t>7,14</a:t>
+                      </a:r>
+                    </a:p>
+                  </a:txBody>
+                  <a:tcPr/>
+                </a:tc>
+                <a:tc>
+                  <a:txBody>
+                    <a:bodyPr/>
+                    <a:lstStyle/>
+                    <a:p>
+                      <a:endParaRPr lang="fr-FR" sz="1000">
+                        <a:latin typeface="Verdana" panose="020B0604030504040204" pitchFamily="34" charset="0"/>
+                        <a:ea typeface="Verdana" panose="020B0604030504040204" pitchFamily="34" charset="0"/>
+                      </a:endParaRPr>
+                    </a:p>
+                  </a:txBody>
+                  <a:tcPr/>
+                </a:tc>
+                <a:tc>
+                  <a:txBody>
+                    <a:bodyPr/>
+                    <a:lstStyle/>
+                    <a:p>
+                      <a:endParaRPr lang="fr-FR" sz="1000" dirty="0">
+                        <a:latin typeface="Verdana" panose="020B0604030504040204" pitchFamily="34" charset="0"/>
+                        <a:ea typeface="Verdana" panose="020B0604030504040204" pitchFamily="34" charset="0"/>
+                      </a:endParaRPr>
+                    </a:p>
+                  </a:txBody>
+                  <a:tcPr/>
+                </a:tc>
+                <a:extLst>
+                  <a:ext uri="{0D108BD9-81ED-4DB2-BD59-A6C34878D82A}">
+                    <a16:rowId xmlns:a16="http://schemas.microsoft.com/office/drawing/2014/main" val="1631379410"/>
+                  </a:ext>
+                </a:extLst>
+              </a:tr>
+              <a:tr h="298483">
+                <a:tc>
+                  <a:txBody>
+                    <a:bodyPr/>
+                    <a:lstStyle/>
+                    <a:p>
+                      <a:r>
+                        <a:rPr lang="fr-FR" sz="1000" dirty="0">
+                          <a:latin typeface="Verdana" panose="020B0604030504040204" pitchFamily="34" charset="0"/>
+                          <a:ea typeface="Verdana" panose="020B0604030504040204" pitchFamily="34" charset="0"/>
+                        </a:rPr>
+                        <a:t>Action-9</a:t>
+                      </a:r>
+                    </a:p>
+                  </a:txBody>
+                  <a:tcPr/>
+                </a:tc>
+                <a:tc>
+                  <a:txBody>
+                    <a:bodyPr/>
+                    <a:lstStyle/>
+                    <a:p>
+                      <a:pPr algn="ctr"/>
+                      <a:endParaRPr lang="fr-FR" sz="1000" dirty="0">
+                        <a:latin typeface="Verdana" panose="020B0604030504040204" pitchFamily="34" charset="0"/>
+                        <a:ea typeface="Verdana" panose="020B0604030504040204" pitchFamily="34" charset="0"/>
+                      </a:endParaRPr>
+                    </a:p>
+                  </a:txBody>
+                  <a:tcPr/>
+                </a:tc>
+                <a:tc>
+                  <a:txBody>
+                    <a:bodyPr/>
+                    <a:lstStyle/>
+                    <a:p>
+                      <a:pPr algn="ctr"/>
+                      <a:r>
+                        <a:rPr lang="fr-FR" sz="1000" dirty="0">
+                          <a:latin typeface="Verdana" panose="020B0604030504040204" pitchFamily="34" charset="0"/>
+                          <a:ea typeface="Verdana" panose="020B0604030504040204" pitchFamily="34" charset="0"/>
+                        </a:rPr>
+                        <a:t>48</a:t>
+                      </a:r>
+                    </a:p>
+                  </a:txBody>
+                  <a:tcPr/>
+                </a:tc>
+                <a:tc>
+                  <a:txBody>
+                    <a:bodyPr/>
+                    <a:lstStyle/>
+                    <a:p>
+                      <a:pPr algn="ctr"/>
+                      <a:r>
+                        <a:rPr lang="fr-FR" sz="1000" dirty="0">
+                          <a:latin typeface="Verdana" panose="020B0604030504040204" pitchFamily="34" charset="0"/>
+                          <a:ea typeface="Verdana" panose="020B0604030504040204" pitchFamily="34" charset="0"/>
+                        </a:rPr>
+                        <a:t>13</a:t>
+                      </a:r>
+                    </a:p>
+                  </a:txBody>
+                  <a:tcPr/>
+                </a:tc>
+                <a:tc>
+                  <a:txBody>
+                    <a:bodyPr/>
+                    <a:lstStyle/>
+                    <a:p>
+                      <a:pPr algn="ctr"/>
+                      <a:r>
+                        <a:rPr lang="fr-FR" sz="1000" dirty="0">
+                          <a:latin typeface="Verdana" panose="020B0604030504040204" pitchFamily="34" charset="0"/>
+                          <a:ea typeface="Verdana" panose="020B0604030504040204" pitchFamily="34" charset="0"/>
+                        </a:rPr>
+                        <a:t>6,24</a:t>
+                      </a:r>
+                    </a:p>
+                  </a:txBody>
+                  <a:tcPr/>
+                </a:tc>
+                <a:tc>
+                  <a:txBody>
+                    <a:bodyPr/>
+                    <a:lstStyle/>
+                    <a:p>
+                      <a:endParaRPr lang="fr-FR" sz="1000">
+                        <a:latin typeface="Verdana" panose="020B0604030504040204" pitchFamily="34" charset="0"/>
+                        <a:ea typeface="Verdana" panose="020B0604030504040204" pitchFamily="34" charset="0"/>
+                      </a:endParaRPr>
+                    </a:p>
+                  </a:txBody>
+                  <a:tcPr/>
+                </a:tc>
+                <a:tc>
+                  <a:txBody>
+                    <a:bodyPr/>
+                    <a:lstStyle/>
+                    <a:p>
+                      <a:endParaRPr lang="fr-FR" sz="1000" dirty="0">
+                        <a:latin typeface="Verdana" panose="020B0604030504040204" pitchFamily="34" charset="0"/>
+                        <a:ea typeface="Verdana" panose="020B0604030504040204" pitchFamily="34" charset="0"/>
+                      </a:endParaRPr>
+                    </a:p>
+                  </a:txBody>
+                  <a:tcPr/>
+                </a:tc>
+                <a:extLst>
+                  <a:ext uri="{0D108BD9-81ED-4DB2-BD59-A6C34878D82A}">
+                    <a16:rowId xmlns:a16="http://schemas.microsoft.com/office/drawing/2014/main" val="1799159266"/>
+                  </a:ext>
+                </a:extLst>
+              </a:tr>
+              <a:tr h="298483">
+                <a:tc>
+                  <a:txBody>
+                    <a:bodyPr/>
+                    <a:lstStyle/>
+                    <a:p>
+                      <a:pPr marL="0" marR="0" lvl="0" indent="0" algn="l" defTabSz="457200" rtl="0" eaLnBrk="1" fontAlgn="auto" latinLnBrk="0" hangingPunct="1">
+                        <a:lnSpc>
+                          <a:spcPct val="100000"/>
+                        </a:lnSpc>
+                        <a:spcBef>
+                          <a:spcPts val="0"/>
+                        </a:spcBef>
+                        <a:spcAft>
+                          <a:spcPts val="0"/>
+                        </a:spcAft>
+                        <a:buClrTx/>
+                        <a:buSzTx/>
+                        <a:buFontTx/>
+                        <a:buNone/>
+                        <a:tabLst/>
+                        <a:defRPr/>
+                      </a:pPr>
+                      <a:r>
+                        <a:rPr lang="fr-FR" sz="1000" dirty="0">
+                          <a:latin typeface="Verdana" panose="020B0604030504040204" pitchFamily="34" charset="0"/>
+                          <a:ea typeface="Verdana" panose="020B0604030504040204" pitchFamily="34" charset="0"/>
+                        </a:rPr>
+                        <a:t>Action-19</a:t>
+                      </a:r>
+                    </a:p>
+                  </a:txBody>
+                  <a:tcPr/>
+                </a:tc>
+                <a:tc>
+                  <a:txBody>
+                    <a:bodyPr/>
+                    <a:lstStyle/>
+                    <a:p>
+                      <a:pPr algn="ctr"/>
+                      <a:endParaRPr lang="fr-FR" sz="1000" dirty="0">
+                        <a:latin typeface="Verdana" panose="020B0604030504040204" pitchFamily="34" charset="0"/>
+                        <a:ea typeface="Verdana" panose="020B0604030504040204" pitchFamily="34" charset="0"/>
+                      </a:endParaRPr>
+                    </a:p>
+                  </a:txBody>
+                  <a:tcPr/>
+                </a:tc>
+                <a:tc>
+                  <a:txBody>
+                    <a:bodyPr/>
+                    <a:lstStyle/>
+                    <a:p>
+                      <a:pPr algn="ctr"/>
+                      <a:r>
+                        <a:rPr lang="fr-FR" sz="1000" dirty="0">
+                          <a:latin typeface="Verdana" panose="020B0604030504040204" pitchFamily="34" charset="0"/>
+                          <a:ea typeface="Verdana" panose="020B0604030504040204" pitchFamily="34" charset="0"/>
+                        </a:rPr>
+                        <a:t>24</a:t>
+                      </a:r>
+                    </a:p>
+                  </a:txBody>
+                  <a:tcPr/>
+                </a:tc>
+                <a:tc>
+                  <a:txBody>
+                    <a:bodyPr/>
+                    <a:lstStyle/>
+                    <a:p>
+                      <a:pPr algn="ctr"/>
+                      <a:r>
+                        <a:rPr lang="fr-FR" sz="1000" dirty="0">
+                          <a:latin typeface="Verdana" panose="020B0604030504040204" pitchFamily="34" charset="0"/>
+                          <a:ea typeface="Verdana" panose="020B0604030504040204" pitchFamily="34" charset="0"/>
+                        </a:rPr>
+                        <a:t>21</a:t>
+                      </a:r>
+                    </a:p>
+                  </a:txBody>
+                  <a:tcPr/>
+                </a:tc>
+                <a:tc>
+                  <a:txBody>
+                    <a:bodyPr/>
+                    <a:lstStyle/>
+                    <a:p>
+                      <a:pPr algn="ctr"/>
+                      <a:r>
+                        <a:rPr lang="fr-FR" sz="1000" dirty="0">
+                          <a:latin typeface="Verdana" panose="020B0604030504040204" pitchFamily="34" charset="0"/>
+                          <a:ea typeface="Verdana" panose="020B0604030504040204" pitchFamily="34" charset="0"/>
+                        </a:rPr>
+                        <a:t>5,04</a:t>
+                      </a:r>
+                    </a:p>
+                  </a:txBody>
+                  <a:tcPr/>
+                </a:tc>
+                <a:tc>
+                  <a:txBody>
+                    <a:bodyPr/>
+                    <a:lstStyle/>
+                    <a:p>
+                      <a:endParaRPr lang="fr-FR" sz="1000" dirty="0">
+                        <a:latin typeface="Verdana" panose="020B0604030504040204" pitchFamily="34" charset="0"/>
+                        <a:ea typeface="Verdana" panose="020B0604030504040204" pitchFamily="34" charset="0"/>
+                      </a:endParaRPr>
+                    </a:p>
+                  </a:txBody>
+                  <a:tcPr/>
+                </a:tc>
+                <a:tc>
+                  <a:txBody>
+                    <a:bodyPr/>
+                    <a:lstStyle/>
+                    <a:p>
+                      <a:endParaRPr lang="fr-FR" sz="1000" dirty="0">
+                        <a:latin typeface="Verdana" panose="020B0604030504040204" pitchFamily="34" charset="0"/>
+                        <a:ea typeface="Verdana" panose="020B0604030504040204" pitchFamily="34" charset="0"/>
+                      </a:endParaRPr>
+                    </a:p>
+                  </a:txBody>
+                  <a:tcPr/>
+                </a:tc>
+                <a:extLst>
+                  <a:ext uri="{0D108BD9-81ED-4DB2-BD59-A6C34878D82A}">
+                    <a16:rowId xmlns:a16="http://schemas.microsoft.com/office/drawing/2014/main" val="936052677"/>
+                  </a:ext>
+                </a:extLst>
+              </a:tr>
+              <a:tr h="298483">
+                <a:tc>
+                  <a:txBody>
+                    <a:bodyPr/>
+                    <a:lstStyle/>
+                    <a:p>
+                      <a:r>
+                        <a:rPr lang="fr-FR" sz="1000" dirty="0">
+                          <a:latin typeface="Verdana" panose="020B0604030504040204" pitchFamily="34" charset="0"/>
+                          <a:ea typeface="Verdana" panose="020B0604030504040204" pitchFamily="34" charset="0"/>
+                        </a:rPr>
+                        <a:t>Action-2</a:t>
+                      </a:r>
+                    </a:p>
+                  </a:txBody>
+                  <a:tcPr/>
+                </a:tc>
+                <a:tc>
+                  <a:txBody>
+                    <a:bodyPr/>
+                    <a:lstStyle/>
+                    <a:p>
+                      <a:pPr algn="ctr"/>
+                      <a:endParaRPr lang="fr-FR" sz="1000" dirty="0">
+                        <a:latin typeface="Verdana" panose="020B0604030504040204" pitchFamily="34" charset="0"/>
+                        <a:ea typeface="Verdana" panose="020B0604030504040204" pitchFamily="34" charset="0"/>
+                      </a:endParaRPr>
+                    </a:p>
+                  </a:txBody>
+                  <a:tcPr/>
+                </a:tc>
+                <a:tc>
+                  <a:txBody>
+                    <a:bodyPr/>
+                    <a:lstStyle/>
+                    <a:p>
+                      <a:pPr algn="ctr"/>
+                      <a:r>
+                        <a:rPr lang="fr-FR" sz="1000" dirty="0">
+                          <a:latin typeface="Verdana" panose="020B0604030504040204" pitchFamily="34" charset="0"/>
+                          <a:ea typeface="Verdana" panose="020B0604030504040204" pitchFamily="34" charset="0"/>
+                        </a:rPr>
+                        <a:t>30</a:t>
+                      </a:r>
+                    </a:p>
+                  </a:txBody>
+                  <a:tcPr/>
+                </a:tc>
+                <a:tc>
+                  <a:txBody>
+                    <a:bodyPr/>
+                    <a:lstStyle/>
+                    <a:p>
+                      <a:pPr algn="ctr"/>
+                      <a:r>
+                        <a:rPr lang="fr-FR" sz="1000" dirty="0">
+                          <a:latin typeface="Verdana" panose="020B0604030504040204" pitchFamily="34" charset="0"/>
+                          <a:ea typeface="Verdana" panose="020B0604030504040204" pitchFamily="34" charset="0"/>
+                        </a:rPr>
+                        <a:t>10</a:t>
+                      </a:r>
+                    </a:p>
+                  </a:txBody>
+                  <a:tcPr/>
+                </a:tc>
+                <a:tc>
+                  <a:txBody>
+                    <a:bodyPr/>
+                    <a:lstStyle/>
+                    <a:p>
+                      <a:pPr algn="ctr"/>
+                      <a:r>
+                        <a:rPr lang="fr-FR" sz="1000" dirty="0">
+                          <a:latin typeface="Verdana" panose="020B0604030504040204" pitchFamily="34" charset="0"/>
+                          <a:ea typeface="Verdana" panose="020B0604030504040204" pitchFamily="34" charset="0"/>
+                        </a:rPr>
+                        <a:t>3</a:t>
+                      </a:r>
+                    </a:p>
+                  </a:txBody>
+                  <a:tcPr/>
+                </a:tc>
+                <a:tc>
+                  <a:txBody>
+                    <a:bodyPr/>
+                    <a:lstStyle/>
+                    <a:p>
+                      <a:endParaRPr lang="fr-FR" sz="1000" dirty="0">
+                        <a:latin typeface="Verdana" panose="020B0604030504040204" pitchFamily="34" charset="0"/>
+                        <a:ea typeface="Verdana" panose="020B0604030504040204" pitchFamily="34" charset="0"/>
+                      </a:endParaRPr>
+                    </a:p>
+                  </a:txBody>
+                  <a:tcPr/>
+                </a:tc>
+                <a:tc>
+                  <a:txBody>
+                    <a:bodyPr/>
+                    <a:lstStyle/>
+                    <a:p>
+                      <a:endParaRPr lang="fr-FR" sz="1000" dirty="0">
+                        <a:latin typeface="Verdana" panose="020B0604030504040204" pitchFamily="34" charset="0"/>
+                        <a:ea typeface="Verdana" panose="020B0604030504040204" pitchFamily="34" charset="0"/>
+                      </a:endParaRPr>
+                    </a:p>
+                  </a:txBody>
+                  <a:tcPr/>
+                </a:tc>
+                <a:extLst>
+                  <a:ext uri="{0D108BD9-81ED-4DB2-BD59-A6C34878D82A}">
+                    <a16:rowId xmlns:a16="http://schemas.microsoft.com/office/drawing/2014/main" val="4066088452"/>
+                  </a:ext>
+                </a:extLst>
+              </a:tr>
+              <a:tr h="298483">
+                <a:tc>
+                  <a:txBody>
+                    <a:bodyPr/>
+                    <a:lstStyle/>
+                    <a:p>
+                      <a:r>
+                        <a:rPr lang="fr-FR" sz="1000" dirty="0">
+                          <a:latin typeface="Verdana" panose="020B0604030504040204" pitchFamily="34" charset="0"/>
+                          <a:ea typeface="Verdana" panose="020B0604030504040204" pitchFamily="34" charset="0"/>
+                        </a:rPr>
+                        <a:t>Action-8</a:t>
+                      </a:r>
+                    </a:p>
+                  </a:txBody>
+                  <a:tcPr/>
+                </a:tc>
+                <a:tc>
+                  <a:txBody>
+                    <a:bodyPr/>
+                    <a:lstStyle/>
+                    <a:p>
+                      <a:pPr algn="ctr"/>
+                      <a:endParaRPr lang="fr-FR" sz="1000">
+                        <a:latin typeface="Verdana" panose="020B0604030504040204" pitchFamily="34" charset="0"/>
+                        <a:ea typeface="Verdana" panose="020B0604030504040204" pitchFamily="34" charset="0"/>
+                      </a:endParaRPr>
+                    </a:p>
+                  </a:txBody>
+                  <a:tcPr/>
+                </a:tc>
+                <a:tc>
+                  <a:txBody>
+                    <a:bodyPr/>
+                    <a:lstStyle/>
+                    <a:p>
+                      <a:pPr algn="ctr"/>
+                      <a:r>
+                        <a:rPr lang="fr-FR" sz="1000" dirty="0">
+                          <a:latin typeface="Verdana" panose="020B0604030504040204" pitchFamily="34" charset="0"/>
+                          <a:ea typeface="Verdana" panose="020B0604030504040204" pitchFamily="34" charset="0"/>
+                        </a:rPr>
+                        <a:t>26</a:t>
+                      </a:r>
+                    </a:p>
+                  </a:txBody>
+                  <a:tcPr/>
+                </a:tc>
+                <a:tc>
+                  <a:txBody>
+                    <a:bodyPr/>
+                    <a:lstStyle/>
+                    <a:p>
+                      <a:pPr algn="ctr"/>
+                      <a:r>
+                        <a:rPr lang="fr-FR" sz="1000" dirty="0">
+                          <a:latin typeface="Verdana" panose="020B0604030504040204" pitchFamily="34" charset="0"/>
+                          <a:ea typeface="Verdana" panose="020B0604030504040204" pitchFamily="34" charset="0"/>
+                        </a:rPr>
+                        <a:t>11</a:t>
+                      </a:r>
+                    </a:p>
+                  </a:txBody>
+                  <a:tcPr/>
+                </a:tc>
+                <a:tc>
+                  <a:txBody>
+                    <a:bodyPr/>
+                    <a:lstStyle/>
+                    <a:p>
+                      <a:pPr algn="ctr"/>
+                      <a:r>
+                        <a:rPr lang="fr-FR" sz="1000" dirty="0">
+                          <a:latin typeface="Verdana" panose="020B0604030504040204" pitchFamily="34" charset="0"/>
+                          <a:ea typeface="Verdana" panose="020B0604030504040204" pitchFamily="34" charset="0"/>
+                        </a:rPr>
+                        <a:t>2,86</a:t>
+                      </a:r>
+                    </a:p>
+                  </a:txBody>
+                  <a:tcPr/>
+                </a:tc>
+                <a:tc>
+                  <a:txBody>
+                    <a:bodyPr/>
+                    <a:lstStyle/>
+                    <a:p>
+                      <a:endParaRPr lang="fr-FR" sz="1000">
+                        <a:latin typeface="Verdana" panose="020B0604030504040204" pitchFamily="34" charset="0"/>
+                        <a:ea typeface="Verdana" panose="020B0604030504040204" pitchFamily="34" charset="0"/>
+                      </a:endParaRPr>
+                    </a:p>
+                  </a:txBody>
+                  <a:tcPr/>
+                </a:tc>
+                <a:tc>
+                  <a:txBody>
+                    <a:bodyPr/>
+                    <a:lstStyle/>
+                    <a:p>
+                      <a:endParaRPr lang="fr-FR" sz="1000" dirty="0">
+                        <a:latin typeface="Verdana" panose="020B0604030504040204" pitchFamily="34" charset="0"/>
+                        <a:ea typeface="Verdana" panose="020B0604030504040204" pitchFamily="34" charset="0"/>
+                      </a:endParaRPr>
+                    </a:p>
+                  </a:txBody>
+                  <a:tcPr/>
+                </a:tc>
+                <a:extLst>
+                  <a:ext uri="{0D108BD9-81ED-4DB2-BD59-A6C34878D82A}">
+                    <a16:rowId xmlns:a16="http://schemas.microsoft.com/office/drawing/2014/main" val="1209086354"/>
+                  </a:ext>
+                </a:extLst>
+              </a:tr>
+              <a:tr h="298483">
+                <a:tc>
+                  <a:txBody>
+                    <a:bodyPr/>
+                    <a:lstStyle/>
+                    <a:p>
+                      <a:r>
+                        <a:rPr lang="fr-FR" sz="1000" dirty="0">
+                          <a:latin typeface="Verdana" panose="020B0604030504040204" pitchFamily="34" charset="0"/>
+                          <a:ea typeface="Verdana" panose="020B0604030504040204" pitchFamily="34" charset="0"/>
+                        </a:rPr>
+                        <a:t>Action-7</a:t>
+                      </a:r>
+                    </a:p>
+                  </a:txBody>
+                  <a:tcPr/>
+                </a:tc>
+                <a:tc>
+                  <a:txBody>
+                    <a:bodyPr/>
+                    <a:lstStyle/>
+                    <a:p>
+                      <a:pPr algn="ctr"/>
+                      <a:endParaRPr lang="fr-FR" sz="1000" dirty="0">
+                        <a:latin typeface="Verdana" panose="020B0604030504040204" pitchFamily="34" charset="0"/>
+                        <a:ea typeface="Verdana" panose="020B0604030504040204" pitchFamily="34" charset="0"/>
+                      </a:endParaRPr>
+                    </a:p>
+                  </a:txBody>
+                  <a:tcPr/>
+                </a:tc>
+                <a:tc>
+                  <a:txBody>
+                    <a:bodyPr/>
+                    <a:lstStyle/>
+                    <a:p>
+                      <a:pPr algn="ctr"/>
+                      <a:r>
+                        <a:rPr lang="fr-FR" sz="1000" dirty="0">
+                          <a:latin typeface="Verdana" panose="020B0604030504040204" pitchFamily="34" charset="0"/>
+                          <a:ea typeface="Verdana" panose="020B0604030504040204" pitchFamily="34" charset="0"/>
+                        </a:rPr>
+                        <a:t>22</a:t>
+                      </a:r>
+                    </a:p>
+                  </a:txBody>
+                  <a:tcPr/>
+                </a:tc>
+                <a:tc>
+                  <a:txBody>
+                    <a:bodyPr/>
+                    <a:lstStyle/>
+                    <a:p>
+                      <a:pPr algn="ctr"/>
+                      <a:r>
+                        <a:rPr lang="fr-FR" sz="1000" dirty="0">
+                          <a:latin typeface="Verdana" panose="020B0604030504040204" pitchFamily="34" charset="0"/>
+                          <a:ea typeface="Verdana" panose="020B0604030504040204" pitchFamily="34" charset="0"/>
+                        </a:rPr>
+                        <a:t>7</a:t>
+                      </a:r>
+                    </a:p>
+                  </a:txBody>
+                  <a:tcPr/>
+                </a:tc>
+                <a:tc>
+                  <a:txBody>
+                    <a:bodyPr/>
+                    <a:lstStyle/>
+                    <a:p>
+                      <a:pPr algn="ctr"/>
+                      <a:r>
+                        <a:rPr lang="fr-FR" sz="1000" dirty="0">
+                          <a:latin typeface="Verdana" panose="020B0604030504040204" pitchFamily="34" charset="0"/>
+                          <a:ea typeface="Verdana" panose="020B0604030504040204" pitchFamily="34" charset="0"/>
+                        </a:rPr>
+                        <a:t>1,54</a:t>
+                      </a:r>
+                    </a:p>
+                  </a:txBody>
+                  <a:tcPr/>
+                </a:tc>
+                <a:tc>
+                  <a:txBody>
+                    <a:bodyPr/>
+                    <a:lstStyle/>
+                    <a:p>
+                      <a:endParaRPr lang="fr-FR" sz="1000" dirty="0">
+                        <a:latin typeface="Verdana" panose="020B0604030504040204" pitchFamily="34" charset="0"/>
+                        <a:ea typeface="Verdana" panose="020B0604030504040204" pitchFamily="34" charset="0"/>
+                      </a:endParaRPr>
+                    </a:p>
+                  </a:txBody>
+                  <a:tcPr/>
+                </a:tc>
+                <a:tc>
+                  <a:txBody>
+                    <a:bodyPr/>
+                    <a:lstStyle/>
+                    <a:p>
+                      <a:endParaRPr lang="fr-FR" sz="1000" dirty="0">
+                        <a:latin typeface="Verdana" panose="020B0604030504040204" pitchFamily="34" charset="0"/>
+                        <a:ea typeface="Verdana" panose="020B0604030504040204" pitchFamily="34" charset="0"/>
+                      </a:endParaRPr>
+                    </a:p>
+                  </a:txBody>
+                  <a:tcPr/>
+                </a:tc>
+                <a:extLst>
+                  <a:ext uri="{0D108BD9-81ED-4DB2-BD59-A6C34878D82A}">
+                    <a16:rowId xmlns:a16="http://schemas.microsoft.com/office/drawing/2014/main" val="2241928363"/>
+                  </a:ext>
+                </a:extLst>
+              </a:tr>
+              <a:tr h="298483">
+                <a:tc>
+                  <a:txBody>
+                    <a:bodyPr/>
+                    <a:lstStyle/>
+                    <a:p>
+                      <a:pPr marL="0" marR="0" lvl="0" indent="0" algn="l" defTabSz="457200" rtl="0" eaLnBrk="1" fontAlgn="auto" latinLnBrk="0" hangingPunct="1">
+                        <a:lnSpc>
+                          <a:spcPct val="100000"/>
+                        </a:lnSpc>
+                        <a:spcBef>
+                          <a:spcPts val="0"/>
+                        </a:spcBef>
+                        <a:spcAft>
+                          <a:spcPts val="0"/>
+                        </a:spcAft>
+                        <a:buClrTx/>
+                        <a:buSzTx/>
+                        <a:buFontTx/>
+                        <a:buNone/>
+                        <a:tabLst/>
+                        <a:defRPr/>
+                      </a:pPr>
+                      <a:r>
+                        <a:rPr lang="fr-FR" sz="1000" dirty="0">
+                          <a:latin typeface="Verdana" panose="020B0604030504040204" pitchFamily="34" charset="0"/>
+                          <a:ea typeface="Verdana" panose="020B0604030504040204" pitchFamily="34" charset="0"/>
+                        </a:rPr>
+                        <a:t>Action-18</a:t>
+                      </a:r>
+                    </a:p>
+                  </a:txBody>
+                  <a:tcPr/>
+                </a:tc>
+                <a:tc>
+                  <a:txBody>
+                    <a:bodyPr/>
+                    <a:lstStyle/>
+                    <a:p>
+                      <a:pPr algn="ctr"/>
+                      <a:endParaRPr lang="fr-FR" sz="1000" dirty="0">
+                        <a:latin typeface="Verdana" panose="020B0604030504040204" pitchFamily="34" charset="0"/>
+                        <a:ea typeface="Verdana" panose="020B0604030504040204" pitchFamily="34" charset="0"/>
+                      </a:endParaRPr>
+                    </a:p>
+                  </a:txBody>
+                  <a:tcPr/>
+                </a:tc>
+                <a:tc>
+                  <a:txBody>
+                    <a:bodyPr/>
+                    <a:lstStyle/>
+                    <a:p>
+                      <a:pPr algn="ctr"/>
+                      <a:r>
+                        <a:rPr lang="fr-FR" sz="1000" dirty="0">
+                          <a:latin typeface="Verdana" panose="020B0604030504040204" pitchFamily="34" charset="0"/>
+                          <a:ea typeface="Verdana" panose="020B0604030504040204" pitchFamily="34" charset="0"/>
+                        </a:rPr>
+                        <a:t>10</a:t>
+                      </a:r>
+                    </a:p>
+                  </a:txBody>
+                  <a:tcPr/>
+                </a:tc>
+                <a:tc>
+                  <a:txBody>
+                    <a:bodyPr/>
+                    <a:lstStyle/>
+                    <a:p>
+                      <a:pPr algn="ctr"/>
+                      <a:r>
+                        <a:rPr lang="fr-FR" sz="1000" dirty="0">
+                          <a:latin typeface="Verdana" panose="020B0604030504040204" pitchFamily="34" charset="0"/>
+                          <a:ea typeface="Verdana" panose="020B0604030504040204" pitchFamily="34" charset="0"/>
+                        </a:rPr>
+                        <a:t>14</a:t>
+                      </a:r>
+                    </a:p>
+                  </a:txBody>
+                  <a:tcPr/>
+                </a:tc>
+                <a:tc>
+                  <a:txBody>
+                    <a:bodyPr/>
+                    <a:lstStyle/>
+                    <a:p>
+                      <a:pPr algn="ctr"/>
+                      <a:r>
+                        <a:rPr lang="fr-FR" sz="1000" dirty="0">
+                          <a:latin typeface="Verdana" panose="020B0604030504040204" pitchFamily="34" charset="0"/>
+                          <a:ea typeface="Verdana" panose="020B0604030504040204" pitchFamily="34" charset="0"/>
+                        </a:rPr>
+                        <a:t>1,4</a:t>
+                      </a:r>
+                    </a:p>
+                  </a:txBody>
+                  <a:tcPr/>
+                </a:tc>
+                <a:tc>
+                  <a:txBody>
+                    <a:bodyPr/>
+                    <a:lstStyle/>
+                    <a:p>
+                      <a:endParaRPr lang="fr-FR" sz="1000" dirty="0">
+                        <a:latin typeface="Verdana" panose="020B0604030504040204" pitchFamily="34" charset="0"/>
+                        <a:ea typeface="Verdana" panose="020B0604030504040204" pitchFamily="34" charset="0"/>
+                      </a:endParaRPr>
+                    </a:p>
+                  </a:txBody>
+                  <a:tcPr/>
+                </a:tc>
+                <a:tc>
+                  <a:txBody>
+                    <a:bodyPr/>
+                    <a:lstStyle/>
+                    <a:p>
+                      <a:endParaRPr lang="fr-FR" sz="1000" dirty="0">
+                        <a:latin typeface="Verdana" panose="020B0604030504040204" pitchFamily="34" charset="0"/>
+                        <a:ea typeface="Verdana" panose="020B0604030504040204" pitchFamily="34" charset="0"/>
+                      </a:endParaRPr>
+                    </a:p>
+                  </a:txBody>
+                  <a:tcPr/>
+                </a:tc>
+                <a:extLst>
+                  <a:ext uri="{0D108BD9-81ED-4DB2-BD59-A6C34878D82A}">
+                    <a16:rowId xmlns:a16="http://schemas.microsoft.com/office/drawing/2014/main" val="4085394526"/>
+                  </a:ext>
+                </a:extLst>
+              </a:tr>
+              <a:tr h="298483">
+                <a:tc>
+                  <a:txBody>
+                    <a:bodyPr/>
+                    <a:lstStyle/>
+                    <a:p>
+                      <a:r>
+                        <a:rPr lang="fr-FR" sz="1000" dirty="0">
+                          <a:latin typeface="Verdana" panose="020B0604030504040204" pitchFamily="34" charset="0"/>
+                          <a:ea typeface="Verdana" panose="020B0604030504040204" pitchFamily="34" charset="0"/>
+                        </a:rPr>
+                        <a:t>Action-1</a:t>
+                      </a:r>
+                    </a:p>
+                  </a:txBody>
+                  <a:tcPr/>
+                </a:tc>
+                <a:tc>
+                  <a:txBody>
+                    <a:bodyPr/>
+                    <a:lstStyle/>
+                    <a:p>
+                      <a:pPr algn="ctr"/>
+                      <a:endParaRPr lang="fr-FR" sz="1000" dirty="0">
+                        <a:latin typeface="Verdana" panose="020B0604030504040204" pitchFamily="34" charset="0"/>
+                        <a:ea typeface="Verdana" panose="020B0604030504040204" pitchFamily="34" charset="0"/>
+                      </a:endParaRPr>
+                    </a:p>
+                  </a:txBody>
+                  <a:tcPr/>
+                </a:tc>
+                <a:tc>
+                  <a:txBody>
+                    <a:bodyPr/>
+                    <a:lstStyle/>
+                    <a:p>
+                      <a:pPr algn="ctr"/>
+                      <a:r>
+                        <a:rPr lang="fr-FR" sz="1000" dirty="0">
+                          <a:latin typeface="Verdana" panose="020B0604030504040204" pitchFamily="34" charset="0"/>
+                          <a:ea typeface="Verdana" panose="020B0604030504040204" pitchFamily="34" charset="0"/>
+                        </a:rPr>
+                        <a:t>20</a:t>
+                      </a:r>
+                    </a:p>
+                  </a:txBody>
+                  <a:tcPr/>
+                </a:tc>
+                <a:tc>
+                  <a:txBody>
+                    <a:bodyPr/>
+                    <a:lstStyle/>
+                    <a:p>
+                      <a:pPr algn="ctr"/>
+                      <a:r>
+                        <a:rPr lang="fr-FR" sz="1000" dirty="0">
+                          <a:latin typeface="Verdana" panose="020B0604030504040204" pitchFamily="34" charset="0"/>
+                          <a:ea typeface="Verdana" panose="020B0604030504040204" pitchFamily="34" charset="0"/>
+                        </a:rPr>
+                        <a:t>5</a:t>
+                      </a:r>
+                    </a:p>
+                  </a:txBody>
+                  <a:tcPr/>
+                </a:tc>
+                <a:tc>
+                  <a:txBody>
+                    <a:bodyPr/>
+                    <a:lstStyle/>
+                    <a:p>
+                      <a:pPr algn="ctr"/>
+                      <a:r>
+                        <a:rPr lang="fr-FR" sz="1000" dirty="0">
+                          <a:latin typeface="Verdana" panose="020B0604030504040204" pitchFamily="34" charset="0"/>
+                          <a:ea typeface="Verdana" panose="020B0604030504040204" pitchFamily="34" charset="0"/>
+                        </a:rPr>
+                        <a:t>1</a:t>
+                      </a:r>
+                    </a:p>
+                  </a:txBody>
+                  <a:tcPr/>
+                </a:tc>
+                <a:tc>
+                  <a:txBody>
+                    <a:bodyPr/>
+                    <a:lstStyle/>
+                    <a:p>
+                      <a:endParaRPr lang="fr-FR" sz="1000" dirty="0">
+                        <a:latin typeface="Verdana" panose="020B0604030504040204" pitchFamily="34" charset="0"/>
+                        <a:ea typeface="Verdana" panose="020B0604030504040204" pitchFamily="34" charset="0"/>
+                      </a:endParaRPr>
+                    </a:p>
+                  </a:txBody>
+                  <a:tcPr/>
+                </a:tc>
+                <a:tc>
+                  <a:txBody>
+                    <a:bodyPr/>
+                    <a:lstStyle/>
+                    <a:p>
+                      <a:endParaRPr lang="fr-FR" sz="1000" dirty="0">
+                        <a:latin typeface="Verdana" panose="020B0604030504040204" pitchFamily="34" charset="0"/>
+                        <a:ea typeface="Verdana" panose="020B0604030504040204" pitchFamily="34" charset="0"/>
+                      </a:endParaRPr>
+                    </a:p>
+                  </a:txBody>
+                  <a:tcPr/>
+                </a:tc>
+                <a:extLst>
+                  <a:ext uri="{0D108BD9-81ED-4DB2-BD59-A6C34878D82A}">
+                    <a16:rowId xmlns:a16="http://schemas.microsoft.com/office/drawing/2014/main" val="2845843229"/>
+                  </a:ext>
+                </a:extLst>
+              </a:tr>
+              <a:tr h="298483">
+                <a:tc>
+                  <a:txBody>
+                    <a:bodyPr/>
+                    <a:lstStyle/>
+                    <a:p>
+                      <a:r>
+                        <a:rPr lang="fr-FR" sz="1000" dirty="0">
+                          <a:latin typeface="Verdana" panose="020B0604030504040204" pitchFamily="34" charset="0"/>
+                          <a:ea typeface="Verdana" panose="020B0604030504040204" pitchFamily="34" charset="0"/>
+                        </a:rPr>
+                        <a:t>Action-16</a:t>
+                      </a:r>
+                    </a:p>
+                  </a:txBody>
+                  <a:tcPr/>
+                </a:tc>
+                <a:tc>
+                  <a:txBody>
+                    <a:bodyPr/>
+                    <a:lstStyle/>
+                    <a:p>
+                      <a:pPr algn="ctr"/>
+                      <a:endParaRPr lang="fr-FR" sz="1000" dirty="0">
+                        <a:latin typeface="Verdana" panose="020B0604030504040204" pitchFamily="34" charset="0"/>
+                        <a:ea typeface="Verdana" panose="020B0604030504040204" pitchFamily="34" charset="0"/>
+                      </a:endParaRPr>
+                    </a:p>
+                  </a:txBody>
+                  <a:tcPr/>
+                </a:tc>
+                <a:tc>
+                  <a:txBody>
+                    <a:bodyPr/>
+                    <a:lstStyle/>
+                    <a:p>
+                      <a:pPr algn="ctr"/>
+                      <a:r>
+                        <a:rPr lang="fr-FR" sz="1000" dirty="0">
+                          <a:latin typeface="Verdana" panose="020B0604030504040204" pitchFamily="34" charset="0"/>
+                          <a:ea typeface="Verdana" panose="020B0604030504040204" pitchFamily="34" charset="0"/>
+                        </a:rPr>
+                        <a:t>8</a:t>
+                      </a:r>
+                    </a:p>
+                  </a:txBody>
+                  <a:tcPr/>
+                </a:tc>
+                <a:tc>
+                  <a:txBody>
+                    <a:bodyPr/>
+                    <a:lstStyle/>
+                    <a:p>
+                      <a:pPr algn="ctr"/>
+                      <a:r>
+                        <a:rPr lang="fr-FR" sz="1000" dirty="0">
+                          <a:latin typeface="Verdana" panose="020B0604030504040204" pitchFamily="34" charset="0"/>
+                          <a:ea typeface="Verdana" panose="020B0604030504040204" pitchFamily="34" charset="0"/>
+                        </a:rPr>
+                        <a:t>8</a:t>
+                      </a:r>
+                    </a:p>
+                  </a:txBody>
+                  <a:tcPr/>
+                </a:tc>
+                <a:tc>
+                  <a:txBody>
+                    <a:bodyPr/>
+                    <a:lstStyle/>
+                    <a:p>
+                      <a:pPr algn="ctr"/>
+                      <a:r>
+                        <a:rPr lang="fr-FR" sz="1000" dirty="0">
+                          <a:latin typeface="Verdana" panose="020B0604030504040204" pitchFamily="34" charset="0"/>
+                          <a:ea typeface="Verdana" panose="020B0604030504040204" pitchFamily="34" charset="0"/>
+                        </a:rPr>
+                        <a:t>0,64</a:t>
+                      </a:r>
+                    </a:p>
+                  </a:txBody>
+                  <a:tcPr/>
+                </a:tc>
+                <a:tc>
+                  <a:txBody>
+                    <a:bodyPr/>
+                    <a:lstStyle/>
+                    <a:p>
+                      <a:endParaRPr lang="fr-FR" sz="1000" dirty="0">
+                        <a:latin typeface="Verdana" panose="020B0604030504040204" pitchFamily="34" charset="0"/>
+                        <a:ea typeface="Verdana" panose="020B0604030504040204" pitchFamily="34" charset="0"/>
+                      </a:endParaRPr>
+                    </a:p>
+                  </a:txBody>
+                  <a:tcPr/>
+                </a:tc>
+                <a:tc>
+                  <a:txBody>
+                    <a:bodyPr/>
+                    <a:lstStyle/>
+                    <a:p>
+                      <a:endParaRPr lang="fr-FR" sz="1000" dirty="0">
+                        <a:latin typeface="Verdana" panose="020B0604030504040204" pitchFamily="34" charset="0"/>
+                        <a:ea typeface="Verdana" panose="020B0604030504040204" pitchFamily="34" charset="0"/>
+                      </a:endParaRPr>
+                    </a:p>
+                  </a:txBody>
+                  <a:tcPr/>
+                </a:tc>
+                <a:extLst>
+                  <a:ext uri="{0D108BD9-81ED-4DB2-BD59-A6C34878D82A}">
+                    <a16:rowId xmlns:a16="http://schemas.microsoft.com/office/drawing/2014/main" val="399881783"/>
+                  </a:ext>
+                </a:extLst>
+              </a:tr>
+              <a:tr h="298483">
+                <a:tc>
+                  <a:txBody>
+                    <a:bodyPr/>
+                    <a:lstStyle/>
+                    <a:p>
+                      <a:r>
+                        <a:rPr lang="fr-FR" sz="1000" dirty="0">
+                          <a:latin typeface="Verdana" panose="020B0604030504040204" pitchFamily="34" charset="0"/>
+                          <a:ea typeface="Verdana" panose="020B0604030504040204" pitchFamily="34" charset="0"/>
+                        </a:rPr>
+                        <a:t>Action-15</a:t>
+                      </a:r>
+                    </a:p>
+                  </a:txBody>
+                  <a:tcPr/>
+                </a:tc>
+                <a:tc>
+                  <a:txBody>
+                    <a:bodyPr/>
+                    <a:lstStyle/>
+                    <a:p>
+                      <a:pPr algn="ctr"/>
+                      <a:endParaRPr lang="fr-FR" sz="1000" dirty="0">
+                        <a:latin typeface="Verdana" panose="020B0604030504040204" pitchFamily="34" charset="0"/>
+                        <a:ea typeface="Verdana" panose="020B0604030504040204" pitchFamily="34" charset="0"/>
+                      </a:endParaRPr>
+                    </a:p>
+                  </a:txBody>
+                  <a:tcPr/>
+                </a:tc>
+                <a:tc>
+                  <a:txBody>
+                    <a:bodyPr/>
+                    <a:lstStyle/>
+                    <a:p>
+                      <a:pPr algn="ctr"/>
+                      <a:r>
+                        <a:rPr lang="fr-FR" sz="1000" dirty="0">
+                          <a:latin typeface="Verdana" panose="020B0604030504040204" pitchFamily="34" charset="0"/>
+                          <a:ea typeface="Verdana" panose="020B0604030504040204" pitchFamily="34" charset="0"/>
+                        </a:rPr>
+                        <a:t>18</a:t>
+                      </a:r>
+                    </a:p>
+                  </a:txBody>
+                  <a:tcPr/>
+                </a:tc>
+                <a:tc>
+                  <a:txBody>
+                    <a:bodyPr/>
+                    <a:lstStyle/>
+                    <a:p>
+                      <a:pPr algn="ctr"/>
+                      <a:r>
+                        <a:rPr lang="fr-FR" sz="1000" dirty="0">
+                          <a:latin typeface="Verdana" panose="020B0604030504040204" pitchFamily="34" charset="0"/>
+                          <a:ea typeface="Verdana" panose="020B0604030504040204" pitchFamily="34" charset="0"/>
+                        </a:rPr>
+                        <a:t>3</a:t>
+                      </a:r>
+                    </a:p>
+                  </a:txBody>
+                  <a:tcPr/>
+                </a:tc>
+                <a:tc>
+                  <a:txBody>
+                    <a:bodyPr/>
+                    <a:lstStyle/>
+                    <a:p>
+                      <a:pPr algn="ctr"/>
+                      <a:r>
+                        <a:rPr lang="fr-FR" sz="1000" dirty="0">
+                          <a:latin typeface="Verdana" panose="020B0604030504040204" pitchFamily="34" charset="0"/>
+                          <a:ea typeface="Verdana" panose="020B0604030504040204" pitchFamily="34" charset="0"/>
+                        </a:rPr>
+                        <a:t>0,54</a:t>
+                      </a:r>
+                    </a:p>
+                  </a:txBody>
+                  <a:tcPr/>
+                </a:tc>
+                <a:tc>
+                  <a:txBody>
+                    <a:bodyPr/>
+                    <a:lstStyle/>
+                    <a:p>
+                      <a:endParaRPr lang="fr-FR" sz="1000" dirty="0">
+                        <a:latin typeface="Verdana" panose="020B0604030504040204" pitchFamily="34" charset="0"/>
+                        <a:ea typeface="Verdana" panose="020B0604030504040204" pitchFamily="34" charset="0"/>
+                      </a:endParaRPr>
+                    </a:p>
+                  </a:txBody>
+                  <a:tcPr/>
+                </a:tc>
+                <a:tc>
+                  <a:txBody>
+                    <a:bodyPr/>
+                    <a:lstStyle/>
+                    <a:p>
+                      <a:endParaRPr lang="fr-FR" sz="1000" dirty="0">
+                        <a:latin typeface="Verdana" panose="020B0604030504040204" pitchFamily="34" charset="0"/>
+                        <a:ea typeface="Verdana" panose="020B0604030504040204" pitchFamily="34" charset="0"/>
+                      </a:endParaRPr>
+                    </a:p>
+                  </a:txBody>
+                  <a:tcPr/>
+                </a:tc>
+                <a:extLst>
+                  <a:ext uri="{0D108BD9-81ED-4DB2-BD59-A6C34878D82A}">
+                    <a16:rowId xmlns:a16="http://schemas.microsoft.com/office/drawing/2014/main" val="4255013586"/>
+                  </a:ext>
+                </a:extLst>
+              </a:tr>
+              <a:tr h="298483">
+                <a:tc>
+                  <a:txBody>
+                    <a:bodyPr/>
+                    <a:lstStyle/>
+                    <a:p>
+                      <a:r>
+                        <a:rPr lang="fr-FR" sz="1000" dirty="0">
+                          <a:latin typeface="Verdana" panose="020B0604030504040204" pitchFamily="34" charset="0"/>
+                          <a:ea typeface="Verdana" panose="020B0604030504040204" pitchFamily="34" charset="0"/>
+                        </a:rPr>
+                        <a:t>Action-17</a:t>
+                      </a:r>
+                    </a:p>
+                  </a:txBody>
+                  <a:tcPr/>
+                </a:tc>
+                <a:tc>
+                  <a:txBody>
+                    <a:bodyPr/>
+                    <a:lstStyle/>
+                    <a:p>
+                      <a:pPr algn="ctr"/>
+                      <a:endParaRPr lang="fr-FR" sz="1000" dirty="0">
+                        <a:latin typeface="Verdana" panose="020B0604030504040204" pitchFamily="34" charset="0"/>
+                        <a:ea typeface="Verdana" panose="020B0604030504040204" pitchFamily="34" charset="0"/>
+                      </a:endParaRPr>
+                    </a:p>
+                  </a:txBody>
+                  <a:tcPr/>
+                </a:tc>
+                <a:tc>
+                  <a:txBody>
+                    <a:bodyPr/>
+                    <a:lstStyle/>
+                    <a:p>
+                      <a:pPr algn="ctr"/>
+                      <a:r>
+                        <a:rPr lang="fr-FR" sz="1000" dirty="0">
+                          <a:latin typeface="Verdana" panose="020B0604030504040204" pitchFamily="34" charset="0"/>
+                          <a:ea typeface="Verdana" panose="020B0604030504040204" pitchFamily="34" charset="0"/>
+                        </a:rPr>
+                        <a:t>4</a:t>
+                      </a:r>
+                    </a:p>
+                  </a:txBody>
+                  <a:tcPr/>
+                </a:tc>
+                <a:tc>
+                  <a:txBody>
+                    <a:bodyPr/>
+                    <a:lstStyle/>
+                    <a:p>
+                      <a:pPr algn="ctr"/>
+                      <a:r>
+                        <a:rPr lang="fr-FR" sz="1000" dirty="0">
+                          <a:latin typeface="Verdana" panose="020B0604030504040204" pitchFamily="34" charset="0"/>
+                          <a:ea typeface="Verdana" panose="020B0604030504040204" pitchFamily="34" charset="0"/>
+                        </a:rPr>
+                        <a:t>12</a:t>
+                      </a:r>
+                    </a:p>
+                  </a:txBody>
+                  <a:tcPr/>
+                </a:tc>
+                <a:tc>
+                  <a:txBody>
+                    <a:bodyPr/>
+                    <a:lstStyle/>
+                    <a:p>
+                      <a:pPr algn="ctr"/>
+                      <a:r>
+                        <a:rPr lang="fr-FR" sz="1000" dirty="0">
+                          <a:latin typeface="Verdana" panose="020B0604030504040204" pitchFamily="34" charset="0"/>
+                          <a:ea typeface="Verdana" panose="020B0604030504040204" pitchFamily="34" charset="0"/>
+                        </a:rPr>
+                        <a:t>0,48</a:t>
+                      </a:r>
+                    </a:p>
+                  </a:txBody>
+                  <a:tcPr/>
+                </a:tc>
+                <a:tc>
+                  <a:txBody>
+                    <a:bodyPr/>
+                    <a:lstStyle/>
+                    <a:p>
+                      <a:endParaRPr lang="fr-FR" sz="1000">
+                        <a:latin typeface="Verdana" panose="020B0604030504040204" pitchFamily="34" charset="0"/>
+                        <a:ea typeface="Verdana" panose="020B0604030504040204" pitchFamily="34" charset="0"/>
+                      </a:endParaRPr>
+                    </a:p>
+                  </a:txBody>
+                  <a:tcPr/>
+                </a:tc>
+                <a:tc>
+                  <a:txBody>
+                    <a:bodyPr/>
+                    <a:lstStyle/>
+                    <a:p>
+                      <a:endParaRPr lang="fr-FR" sz="1000" dirty="0">
+                        <a:latin typeface="Verdana" panose="020B0604030504040204" pitchFamily="34" charset="0"/>
+                        <a:ea typeface="Verdana" panose="020B0604030504040204" pitchFamily="34" charset="0"/>
+                      </a:endParaRPr>
+                    </a:p>
+                  </a:txBody>
+                  <a:tcPr/>
+                </a:tc>
+                <a:extLst>
+                  <a:ext uri="{0D108BD9-81ED-4DB2-BD59-A6C34878D82A}">
+                    <a16:rowId xmlns:a16="http://schemas.microsoft.com/office/drawing/2014/main" val="1316825546"/>
+                  </a:ext>
+                </a:extLst>
+              </a:tr>
+              <a:tr h="298483">
+                <a:tc>
+                  <a:txBody>
+                    <a:bodyPr/>
+                    <a:lstStyle/>
+                    <a:p>
+                      <a:r>
+                        <a:rPr lang="fr-FR" sz="1000" dirty="0">
+                          <a:latin typeface="Verdana" panose="020B0604030504040204" pitchFamily="34" charset="0"/>
+                          <a:ea typeface="Verdana" panose="020B0604030504040204" pitchFamily="34" charset="0"/>
+                        </a:rPr>
+                        <a:t>Action-14</a:t>
+                      </a:r>
+                    </a:p>
+                  </a:txBody>
+                  <a:tcPr/>
+                </a:tc>
+                <a:tc>
+                  <a:txBody>
+                    <a:bodyPr/>
+                    <a:lstStyle/>
+                    <a:p>
+                      <a:pPr algn="ctr"/>
+                      <a:endParaRPr lang="fr-FR" sz="1000" dirty="0">
+                        <a:latin typeface="Verdana" panose="020B0604030504040204" pitchFamily="34" charset="0"/>
+                        <a:ea typeface="Verdana" panose="020B0604030504040204" pitchFamily="34" charset="0"/>
+                      </a:endParaRPr>
+                    </a:p>
+                  </a:txBody>
+                  <a:tcPr/>
+                </a:tc>
+                <a:tc>
+                  <a:txBody>
+                    <a:bodyPr/>
+                    <a:lstStyle/>
+                    <a:p>
+                      <a:pPr algn="ctr"/>
+                      <a:r>
+                        <a:rPr lang="fr-FR" sz="1000" dirty="0">
+                          <a:latin typeface="Verdana" panose="020B0604030504040204" pitchFamily="34" charset="0"/>
+                          <a:ea typeface="Verdana" panose="020B0604030504040204" pitchFamily="34" charset="0"/>
+                        </a:rPr>
+                        <a:t>14</a:t>
+                      </a:r>
+                    </a:p>
+                  </a:txBody>
+                  <a:tcPr/>
+                </a:tc>
+                <a:tc>
+                  <a:txBody>
+                    <a:bodyPr/>
+                    <a:lstStyle/>
+                    <a:p>
+                      <a:pPr algn="ctr"/>
+                      <a:r>
+                        <a:rPr lang="fr-FR" sz="1000" dirty="0">
+                          <a:latin typeface="Verdana" panose="020B0604030504040204" pitchFamily="34" charset="0"/>
+                          <a:ea typeface="Verdana" panose="020B0604030504040204" pitchFamily="34" charset="0"/>
+                        </a:rPr>
+                        <a:t>1</a:t>
+                      </a:r>
+                    </a:p>
+                  </a:txBody>
+                  <a:tcPr/>
+                </a:tc>
+                <a:tc>
+                  <a:txBody>
+                    <a:bodyPr/>
+                    <a:lstStyle/>
+                    <a:p>
+                      <a:pPr algn="ctr"/>
+                      <a:r>
+                        <a:rPr lang="fr-FR" sz="1000" dirty="0">
+                          <a:latin typeface="Verdana" panose="020B0604030504040204" pitchFamily="34" charset="0"/>
+                          <a:ea typeface="Verdana" panose="020B0604030504040204" pitchFamily="34" charset="0"/>
+                        </a:rPr>
+                        <a:t>0,14</a:t>
+                      </a:r>
+                    </a:p>
+                  </a:txBody>
+                  <a:tcPr/>
+                </a:tc>
+                <a:tc>
+                  <a:txBody>
+                    <a:bodyPr/>
+                    <a:lstStyle/>
+                    <a:p>
+                      <a:endParaRPr lang="fr-FR" sz="1000" dirty="0">
+                        <a:latin typeface="Verdana" panose="020B0604030504040204" pitchFamily="34" charset="0"/>
+                        <a:ea typeface="Verdana" panose="020B0604030504040204" pitchFamily="34" charset="0"/>
+                      </a:endParaRPr>
+                    </a:p>
+                  </a:txBody>
+                  <a:tcPr/>
+                </a:tc>
+                <a:tc>
+                  <a:txBody>
+                    <a:bodyPr/>
+                    <a:lstStyle/>
+                    <a:p>
+                      <a:endParaRPr lang="fr-FR" sz="1000" dirty="0">
+                        <a:latin typeface="Verdana" panose="020B0604030504040204" pitchFamily="34" charset="0"/>
+                        <a:ea typeface="Verdana" panose="020B0604030504040204" pitchFamily="34" charset="0"/>
+                      </a:endParaRPr>
+                    </a:p>
+                  </a:txBody>
+                  <a:tcPr/>
+                </a:tc>
+                <a:extLst>
+                  <a:ext uri="{0D108BD9-81ED-4DB2-BD59-A6C34878D82A}">
+                    <a16:rowId xmlns:a16="http://schemas.microsoft.com/office/drawing/2014/main" val="1734270130"/>
+                  </a:ext>
+                </a:extLst>
+              </a:tr>
+              <a:tr h="298483">
+                <a:tc>
+                  <a:txBody>
+                    <a:bodyPr/>
+                    <a:lstStyle/>
+                    <a:p>
+                      <a:endParaRPr lang="fr-FR" sz="1000" dirty="0">
+                        <a:latin typeface="Verdana" panose="020B0604030504040204" pitchFamily="34" charset="0"/>
+                        <a:ea typeface="Verdana" panose="020B0604030504040204" pitchFamily="34" charset="0"/>
+                      </a:endParaRPr>
+                    </a:p>
+                  </a:txBody>
+                  <a:tcPr/>
+                </a:tc>
+                <a:tc>
+                  <a:txBody>
+                    <a:bodyPr/>
+                    <a:lstStyle/>
+                    <a:p>
+                      <a:pPr algn="ctr"/>
+                      <a:endParaRPr lang="fr-FR" sz="1000" dirty="0">
+                        <a:latin typeface="Verdana" panose="020B0604030504040204" pitchFamily="34" charset="0"/>
+                        <a:ea typeface="Verdana" panose="020B0604030504040204" pitchFamily="34" charset="0"/>
+                      </a:endParaRPr>
+                    </a:p>
+                  </a:txBody>
+                  <a:tcPr/>
+                </a:tc>
+                <a:tc>
+                  <a:txBody>
+                    <a:bodyPr/>
+                    <a:lstStyle/>
+                    <a:p>
+                      <a:pPr algn="ctr"/>
+                      <a:endParaRPr lang="fr-FR" sz="1000" dirty="0">
+                        <a:latin typeface="Verdana" panose="020B0604030504040204" pitchFamily="34" charset="0"/>
+                        <a:ea typeface="Verdana" panose="020B0604030504040204" pitchFamily="34" charset="0"/>
+                      </a:endParaRPr>
+                    </a:p>
+                  </a:txBody>
+                  <a:tcPr/>
+                </a:tc>
+                <a:tc>
+                  <a:txBody>
+                    <a:bodyPr/>
+                    <a:lstStyle/>
+                    <a:p>
+                      <a:pPr algn="ctr"/>
+                      <a:endParaRPr lang="fr-FR" sz="1000" dirty="0">
+                        <a:latin typeface="Verdana" panose="020B0604030504040204" pitchFamily="34" charset="0"/>
+                        <a:ea typeface="Verdana" panose="020B0604030504040204" pitchFamily="34" charset="0"/>
+                      </a:endParaRPr>
+                    </a:p>
+                  </a:txBody>
+                  <a:tcPr/>
+                </a:tc>
+                <a:tc>
+                  <a:txBody>
+                    <a:bodyPr/>
+                    <a:lstStyle/>
+                    <a:p>
+                      <a:pPr algn="ctr"/>
+                      <a:endParaRPr lang="fr-FR" sz="1000" dirty="0">
+                        <a:latin typeface="Verdana" panose="020B0604030504040204" pitchFamily="34" charset="0"/>
+                        <a:ea typeface="Verdana" panose="020B0604030504040204" pitchFamily="34" charset="0"/>
+                      </a:endParaRPr>
+                    </a:p>
+                  </a:txBody>
+                  <a:tcPr/>
+                </a:tc>
+                <a:tc>
+                  <a:txBody>
+                    <a:bodyPr/>
+                    <a:lstStyle/>
+                    <a:p>
+                      <a:endParaRPr lang="fr-FR" sz="1000" b="1" dirty="0">
+                        <a:solidFill>
+                          <a:schemeClr val="bg1"/>
+                        </a:solidFill>
+                        <a:highlight>
+                          <a:srgbClr val="800000"/>
+                        </a:highlight>
+                        <a:latin typeface="Verdana" panose="020B0604030504040204" pitchFamily="34" charset="0"/>
+                        <a:ea typeface="Verdana" panose="020B0604030504040204" pitchFamily="34" charset="0"/>
+                      </a:endParaRPr>
+                    </a:p>
+                  </a:txBody>
+                  <a:tcPr>
+                    <a:solidFill>
+                      <a:schemeClr val="accent1">
+                        <a:lumMod val="75000"/>
+                      </a:schemeClr>
+                    </a:solidFill>
+                  </a:tcPr>
+                </a:tc>
+                <a:tc>
+                  <a:txBody>
+                    <a:bodyPr/>
+                    <a:lstStyle/>
+                    <a:p>
+                      <a:endParaRPr lang="fr-FR" sz="1000" b="1" dirty="0">
+                        <a:solidFill>
+                          <a:schemeClr val="bg1"/>
+                        </a:solidFill>
+                        <a:highlight>
+                          <a:srgbClr val="800000"/>
+                        </a:highlight>
+                        <a:latin typeface="Verdana" panose="020B0604030504040204" pitchFamily="34" charset="0"/>
+                        <a:ea typeface="Verdana" panose="020B0604030504040204" pitchFamily="34" charset="0"/>
+                      </a:endParaRPr>
+                    </a:p>
+                  </a:txBody>
+                  <a:tcPr>
+                    <a:solidFill>
+                      <a:schemeClr val="accent1">
+                        <a:lumMod val="75000"/>
+                      </a:schemeClr>
+                    </a:solidFill>
+                  </a:tcPr>
+                </a:tc>
+                <a:extLst>
+                  <a:ext uri="{0D108BD9-81ED-4DB2-BD59-A6C34878D82A}">
+                    <a16:rowId xmlns:a16="http://schemas.microsoft.com/office/drawing/2014/main" val="2681392842"/>
+                  </a:ext>
+                </a:extLst>
+              </a:tr>
+            </a:tbl>
+          </a:graphicData>
+        </a:graphic>
+      </p:graphicFrame>
+      <p:sp>
+        <p:nvSpPr>
+          <p:cNvPr id="7" name="ZoneTexte 6">
+            <a:extLst>
+              <a:ext uri="{FF2B5EF4-FFF2-40B4-BE49-F238E27FC236}">
+                <a16:creationId xmlns:a16="http://schemas.microsoft.com/office/drawing/2014/main" id="{6AF2F513-D8C7-D162-4717-7C99D94F4D67}"/>
+              </a:ext>
+            </a:extLst>
+          </p:cNvPr>
+          <p:cNvSpPr txBox="1"/>
+          <p:nvPr/>
+        </p:nvSpPr>
+        <p:spPr>
+          <a:xfrm>
+            <a:off x="9798341" y="128999"/>
+            <a:ext cx="2323751" cy="307777"/>
+          </a:xfrm>
+          <a:prstGeom prst="rect">
+            <a:avLst/>
+          </a:prstGeom>
+          <a:noFill/>
+        </p:spPr>
+        <p:txBody>
+          <a:bodyPr wrap="square" rtlCol="0">
+            <a:spAutoFit/>
+          </a:bodyPr>
+          <a:lstStyle/>
+          <a:p>
+            <a:r>
+              <a:rPr lang="fr-FR" sz="1400" u="sng" dirty="0">
+                <a:latin typeface="Verdana" panose="020B0604030504040204" pitchFamily="34" charset="0"/>
+                <a:ea typeface="Verdana" panose="020B0604030504040204" pitchFamily="34" charset="0"/>
+              </a:rPr>
+              <a:t>Contrainte</a:t>
+            </a:r>
+            <a:r>
+              <a:rPr lang="fr-FR" sz="1400" b="1" dirty="0">
+                <a:latin typeface="Verdana" panose="020B0604030504040204" pitchFamily="34" charset="0"/>
+                <a:ea typeface="Verdana" panose="020B0604030504040204" pitchFamily="34" charset="0"/>
+              </a:rPr>
+              <a:t>: 500€</a:t>
+            </a:r>
+          </a:p>
+        </p:txBody>
+      </p:sp>
     </p:spTree>
     <p:extLst>
       <p:ext uri="{BB962C8B-B14F-4D97-AF65-F5344CB8AC3E}">
-        <p14:creationId xmlns:p14="http://schemas.microsoft.com/office/powerpoint/2010/main" val="2776155270"/>
+        <p14:creationId xmlns:p14="http://schemas.microsoft.com/office/powerpoint/2010/main" val="3545273169"/>
       </p:ext>
     </p:extLst>
   </p:cSld>

</xml_diff>